<commit_message>
Deploying to gh-pages from @ YoungJIn94/YoungJIn94.github.io@012417a2e679997f684ff3222f5f2ee9fb20e54b 🚀
</commit_message>
<xml_diff>
--- a/assets/img/publication_preview/E2ECamera.pptx
+++ b/assets/img/publication_preview/E2ECamera.pptx
@@ -2367,184 +2367,12 @@
           <a:chExt cx="0" cy="0"/>
         </a:xfrm>
       </p:grpSpPr>
-      <p:sp>
-        <p:nvSpPr>
-          <p:cNvPr id="4" name="TextBox 3">
+      <p:pic>
+        <p:nvPicPr>
+          <p:cNvPr id="8" name="그림 7">
             <a:extLst>
               <a:ext uri="{FF2B5EF4-FFF2-40B4-BE49-F238E27FC236}">
-                <a16:creationId xmlns:a16="http://schemas.microsoft.com/office/drawing/2014/main" id="{9D20D69F-357C-4908-A803-397CD34418DA}"/>
-              </a:ext>
-            </a:extLst>
-          </p:cNvPr>
-          <p:cNvSpPr txBox="1"/>
-          <p:nvPr/>
-        </p:nvSpPr>
-        <p:spPr>
-          <a:xfrm>
-            <a:off x="701349" y="-36209"/>
-            <a:ext cx="1141647" cy="253274"/>
-          </a:xfrm>
-          <a:prstGeom prst="rect">
-            <a:avLst/>
-          </a:prstGeom>
-          <a:noFill/>
-        </p:spPr>
-        <p:txBody>
-          <a:bodyPr wrap="square" rtlCol="0">
-            <a:spAutoFit/>
-          </a:bodyPr>
-          <a:lstStyle/>
-          <a:p>
-            <a:pPr algn="ctr"/>
-            <a:r>
-              <a:rPr lang="en-US" altLang="ko-KR" sz="1000" b="1" dirty="0">
-                <a:latin typeface="helvetica" panose="020B0604020202020204" pitchFamily="34" charset="0"/>
-                <a:cs typeface="helvetica" panose="020B0604020202020204" pitchFamily="34" charset="0"/>
-              </a:rPr>
-              <a:t>Raw</a:t>
-            </a:r>
-            <a:endParaRPr lang="ko-KR" altLang="en-US" sz="1000" b="1" dirty="0">
-              <a:latin typeface="helvetica" panose="020B0604020202020204" pitchFamily="34" charset="0"/>
-              <a:cs typeface="helvetica" panose="020B0604020202020204" pitchFamily="34" charset="0"/>
-            </a:endParaRPr>
-          </a:p>
-        </p:txBody>
-      </p:sp>
-      <p:sp>
-        <p:nvSpPr>
-          <p:cNvPr id="5" name="TextBox 4">
-            <a:extLst>
-              <a:ext uri="{FF2B5EF4-FFF2-40B4-BE49-F238E27FC236}">
-                <a16:creationId xmlns:a16="http://schemas.microsoft.com/office/drawing/2014/main" id="{C89DE598-7CAB-4474-AAE1-818256996A53}"/>
-              </a:ext>
-            </a:extLst>
-          </p:cNvPr>
-          <p:cNvSpPr txBox="1"/>
-          <p:nvPr/>
-        </p:nvSpPr>
-        <p:spPr>
-          <a:xfrm>
-            <a:off x="2199998" y="-47030"/>
-            <a:ext cx="1240004" cy="253274"/>
-          </a:xfrm>
-          <a:prstGeom prst="rect">
-            <a:avLst/>
-          </a:prstGeom>
-          <a:noFill/>
-        </p:spPr>
-        <p:txBody>
-          <a:bodyPr wrap="square" rtlCol="0">
-            <a:spAutoFit/>
-          </a:bodyPr>
-          <a:lstStyle/>
-          <a:p>
-            <a:pPr algn="ctr"/>
-            <a:r>
-              <a:rPr lang="en-US" altLang="ko-KR" sz="1000" b="1" dirty="0">
-                <a:latin typeface="helvetica" panose="020B0604020202020204" pitchFamily="34" charset="0"/>
-                <a:cs typeface="helvetica" panose="020B0604020202020204" pitchFamily="34" charset="0"/>
-              </a:rPr>
-              <a:t>Reconstructed</a:t>
-            </a:r>
-            <a:endParaRPr lang="ko-KR" altLang="en-US" sz="1000" b="1" dirty="0">
-              <a:latin typeface="helvetica" panose="020B0604020202020204" pitchFamily="34" charset="0"/>
-              <a:cs typeface="helvetica" panose="020B0604020202020204" pitchFamily="34" charset="0"/>
-            </a:endParaRPr>
-          </a:p>
-        </p:txBody>
-      </p:sp>
-      <p:sp>
-        <p:nvSpPr>
-          <p:cNvPr id="6" name="TextBox 5">
-            <a:extLst>
-              <a:ext uri="{FF2B5EF4-FFF2-40B4-BE49-F238E27FC236}">
-                <a16:creationId xmlns:a16="http://schemas.microsoft.com/office/drawing/2014/main" id="{0E14188E-BA84-4CF2-A5C2-7BDE212F8ECD}"/>
-              </a:ext>
-            </a:extLst>
-          </p:cNvPr>
-          <p:cNvSpPr txBox="1"/>
-          <p:nvPr/>
-        </p:nvSpPr>
-        <p:spPr>
-          <a:xfrm>
-            <a:off x="-85806" y="794082"/>
-            <a:ext cx="670983" cy="253274"/>
-          </a:xfrm>
-          <a:prstGeom prst="rect">
-            <a:avLst/>
-          </a:prstGeom>
-          <a:noFill/>
-        </p:spPr>
-        <p:txBody>
-          <a:bodyPr wrap="square" rtlCol="0">
-            <a:spAutoFit/>
-          </a:bodyPr>
-          <a:lstStyle/>
-          <a:p>
-            <a:pPr algn="ctr"/>
-            <a:r>
-              <a:rPr lang="en-US" altLang="ko-KR" sz="1000" b="1" dirty="0">
-                <a:latin typeface="helvetica" panose="020B0604020202020204" pitchFamily="34" charset="0"/>
-                <a:cs typeface="helvetica" panose="020B0604020202020204" pitchFamily="34" charset="0"/>
-              </a:rPr>
-              <a:t>Singlet</a:t>
-            </a:r>
-            <a:endParaRPr lang="ko-KR" altLang="en-US" sz="1000" b="1" dirty="0">
-              <a:latin typeface="helvetica" panose="020B0604020202020204" pitchFamily="34" charset="0"/>
-              <a:cs typeface="helvetica" panose="020B0604020202020204" pitchFamily="34" charset="0"/>
-            </a:endParaRPr>
-          </a:p>
-        </p:txBody>
-      </p:sp>
-      <p:sp>
-        <p:nvSpPr>
-          <p:cNvPr id="7" name="TextBox 6">
-            <a:extLst>
-              <a:ext uri="{FF2B5EF4-FFF2-40B4-BE49-F238E27FC236}">
-                <a16:creationId xmlns:a16="http://schemas.microsoft.com/office/drawing/2014/main" id="{0FF46201-A366-4A3C-BE03-4A96D4A4D989}"/>
-              </a:ext>
-            </a:extLst>
-          </p:cNvPr>
-          <p:cNvSpPr txBox="1"/>
-          <p:nvPr/>
-        </p:nvSpPr>
-        <p:spPr>
-          <a:xfrm>
-            <a:off x="-85806" y="2342781"/>
-            <a:ext cx="670983" cy="253274"/>
-          </a:xfrm>
-          <a:prstGeom prst="rect">
-            <a:avLst/>
-          </a:prstGeom>
-          <a:noFill/>
-        </p:spPr>
-        <p:txBody>
-          <a:bodyPr wrap="square" rtlCol="0">
-            <a:spAutoFit/>
-          </a:bodyPr>
-          <a:lstStyle/>
-          <a:p>
-            <a:pPr algn="ctr"/>
-            <a:r>
-              <a:rPr lang="en-US" altLang="ko-KR" sz="1000" b="1" dirty="0">
-                <a:latin typeface="helvetica" panose="020B0604020202020204" pitchFamily="34" charset="0"/>
-                <a:cs typeface="helvetica" panose="020B0604020202020204" pitchFamily="34" charset="0"/>
-              </a:rPr>
-              <a:t>Ours</a:t>
-            </a:r>
-            <a:endParaRPr lang="ko-KR" altLang="en-US" sz="1000" b="1" dirty="0">
-              <a:latin typeface="helvetica" panose="020B0604020202020204" pitchFamily="34" charset="0"/>
-              <a:cs typeface="helvetica" panose="020B0604020202020204" pitchFamily="34" charset="0"/>
-            </a:endParaRPr>
-          </a:p>
-        </p:txBody>
-      </p:sp>
-      <p:pic>
-        <p:nvPicPr>
-          <p:cNvPr id="24" name="그림 23">
-            <a:extLst>
-              <a:ext uri="{FF2B5EF4-FFF2-40B4-BE49-F238E27FC236}">
-                <a16:creationId xmlns:a16="http://schemas.microsoft.com/office/drawing/2014/main" id="{66E4E4FF-D0B9-41B8-B88F-9143B480C272}"/>
+                <a16:creationId xmlns:a16="http://schemas.microsoft.com/office/drawing/2014/main" id="{72DE56F5-5193-4D83-94C4-8837A2B8F5D6}"/>
               </a:ext>
             </a:extLst>
           </p:cNvPr>
@@ -2567,7 +2395,7 @@
         </p:blipFill>
         <p:spPr>
           <a:xfrm>
-            <a:off x="516172" y="164719"/>
+            <a:off x="2064000" y="1706601"/>
             <a:ext cx="1512000" cy="1512000"/>
           </a:xfrm>
           <a:prstGeom prst="rect">
@@ -2577,10 +2405,10 @@
       </p:pic>
       <p:pic>
         <p:nvPicPr>
-          <p:cNvPr id="26" name="그림 25">
+          <p:cNvPr id="10" name="그림 9">
             <a:extLst>
               <a:ext uri="{FF2B5EF4-FFF2-40B4-BE49-F238E27FC236}">
-                <a16:creationId xmlns:a16="http://schemas.microsoft.com/office/drawing/2014/main" id="{5774D9B2-BA23-4FDF-99BA-596BACE5190A}"/>
+                <a16:creationId xmlns:a16="http://schemas.microsoft.com/office/drawing/2014/main" id="{E06D5577-C201-490E-BFB7-89F6B4C571B7}"/>
               </a:ext>
             </a:extLst>
           </p:cNvPr>
@@ -2603,7 +2431,7 @@
         </p:blipFill>
         <p:spPr>
           <a:xfrm>
-            <a:off x="2064000" y="1713418"/>
+            <a:off x="516172" y="1706601"/>
             <a:ext cx="1512000" cy="1512000"/>
           </a:xfrm>
           <a:prstGeom prst="rect">
@@ -2613,10 +2441,10 @@
       </p:pic>
       <p:pic>
         <p:nvPicPr>
-          <p:cNvPr id="28" name="그림 27">
+          <p:cNvPr id="12" name="그림 11">
             <a:extLst>
               <a:ext uri="{FF2B5EF4-FFF2-40B4-BE49-F238E27FC236}">
-                <a16:creationId xmlns:a16="http://schemas.microsoft.com/office/drawing/2014/main" id="{0448D903-8836-48C1-A512-F768A670F8AC}"/>
+                <a16:creationId xmlns:a16="http://schemas.microsoft.com/office/drawing/2014/main" id="{5E7EDF87-0293-48F4-9ACB-81DD0B6B623C}"/>
               </a:ext>
             </a:extLst>
           </p:cNvPr>
@@ -2639,7 +2467,7 @@
         </p:blipFill>
         <p:spPr>
           <a:xfrm>
-            <a:off x="516172" y="1713418"/>
+            <a:off x="2064000" y="164719"/>
             <a:ext cx="1512000" cy="1512000"/>
           </a:xfrm>
           <a:prstGeom prst="rect">
@@ -2649,10 +2477,10 @@
       </p:pic>
       <p:pic>
         <p:nvPicPr>
-          <p:cNvPr id="30" name="그림 29">
+          <p:cNvPr id="14" name="그림 13">
             <a:extLst>
               <a:ext uri="{FF2B5EF4-FFF2-40B4-BE49-F238E27FC236}">
-                <a16:creationId xmlns:a16="http://schemas.microsoft.com/office/drawing/2014/main" id="{12C288C5-1C2E-4C3F-96D6-E2740A900E68}"/>
+                <a16:creationId xmlns:a16="http://schemas.microsoft.com/office/drawing/2014/main" id="{3F49710F-A9F8-47EF-9C38-0307CE041284}"/>
               </a:ext>
             </a:extLst>
           </p:cNvPr>
@@ -2675,7 +2503,7 @@
         </p:blipFill>
         <p:spPr>
           <a:xfrm>
-            <a:off x="2064000" y="164719"/>
+            <a:off x="516172" y="164719"/>
             <a:ext cx="1512000" cy="1512000"/>
           </a:xfrm>
           <a:prstGeom prst="rect">
@@ -2683,6 +2511,178 @@
           </a:prstGeom>
         </p:spPr>
       </p:pic>
+      <p:sp>
+        <p:nvSpPr>
+          <p:cNvPr id="4" name="TextBox 3">
+            <a:extLst>
+              <a:ext uri="{FF2B5EF4-FFF2-40B4-BE49-F238E27FC236}">
+                <a16:creationId xmlns:a16="http://schemas.microsoft.com/office/drawing/2014/main" id="{9D20D69F-357C-4908-A803-397CD34418DA}"/>
+              </a:ext>
+            </a:extLst>
+          </p:cNvPr>
+          <p:cNvSpPr txBox="1"/>
+          <p:nvPr/>
+        </p:nvSpPr>
+        <p:spPr>
+          <a:xfrm>
+            <a:off x="701349" y="-36209"/>
+            <a:ext cx="1141647" cy="261610"/>
+          </a:xfrm>
+          <a:prstGeom prst="rect">
+            <a:avLst/>
+          </a:prstGeom>
+          <a:noFill/>
+        </p:spPr>
+        <p:txBody>
+          <a:bodyPr wrap="square" rtlCol="0">
+            <a:spAutoFit/>
+          </a:bodyPr>
+          <a:lstStyle/>
+          <a:p>
+            <a:pPr algn="ctr"/>
+            <a:r>
+              <a:rPr lang="en-US" altLang="ko-KR" sz="1100" b="1" dirty="0">
+                <a:latin typeface="helvetica" panose="020B0604020202020204" pitchFamily="34" charset="0"/>
+                <a:cs typeface="helvetica" panose="020B0604020202020204" pitchFamily="34" charset="0"/>
+              </a:rPr>
+              <a:t>Raw</a:t>
+            </a:r>
+            <a:endParaRPr lang="ko-KR" altLang="en-US" sz="1100" b="1" dirty="0">
+              <a:latin typeface="helvetica" panose="020B0604020202020204" pitchFamily="34" charset="0"/>
+              <a:cs typeface="helvetica" panose="020B0604020202020204" pitchFamily="34" charset="0"/>
+            </a:endParaRPr>
+          </a:p>
+        </p:txBody>
+      </p:sp>
+      <p:sp>
+        <p:nvSpPr>
+          <p:cNvPr id="5" name="TextBox 4">
+            <a:extLst>
+              <a:ext uri="{FF2B5EF4-FFF2-40B4-BE49-F238E27FC236}">
+                <a16:creationId xmlns:a16="http://schemas.microsoft.com/office/drawing/2014/main" id="{C89DE598-7CAB-4474-AAE1-818256996A53}"/>
+              </a:ext>
+            </a:extLst>
+          </p:cNvPr>
+          <p:cNvSpPr txBox="1"/>
+          <p:nvPr/>
+        </p:nvSpPr>
+        <p:spPr>
+          <a:xfrm>
+            <a:off x="2199998" y="-47030"/>
+            <a:ext cx="1240004" cy="261610"/>
+          </a:xfrm>
+          <a:prstGeom prst="rect">
+            <a:avLst/>
+          </a:prstGeom>
+          <a:noFill/>
+        </p:spPr>
+        <p:txBody>
+          <a:bodyPr wrap="square" rtlCol="0">
+            <a:spAutoFit/>
+          </a:bodyPr>
+          <a:lstStyle/>
+          <a:p>
+            <a:pPr algn="ctr"/>
+            <a:r>
+              <a:rPr lang="en-US" altLang="ko-KR" sz="1100" b="1" dirty="0">
+                <a:latin typeface="helvetica" panose="020B0604020202020204" pitchFamily="34" charset="0"/>
+                <a:cs typeface="helvetica" panose="020B0604020202020204" pitchFamily="34" charset="0"/>
+              </a:rPr>
+              <a:t>Reconstructed</a:t>
+            </a:r>
+            <a:endParaRPr lang="ko-KR" altLang="en-US" sz="1100" b="1" dirty="0">
+              <a:latin typeface="helvetica" panose="020B0604020202020204" pitchFamily="34" charset="0"/>
+              <a:cs typeface="helvetica" panose="020B0604020202020204" pitchFamily="34" charset="0"/>
+            </a:endParaRPr>
+          </a:p>
+        </p:txBody>
+      </p:sp>
+      <p:sp>
+        <p:nvSpPr>
+          <p:cNvPr id="6" name="TextBox 5">
+            <a:extLst>
+              <a:ext uri="{FF2B5EF4-FFF2-40B4-BE49-F238E27FC236}">
+                <a16:creationId xmlns:a16="http://schemas.microsoft.com/office/drawing/2014/main" id="{0E14188E-BA84-4CF2-A5C2-7BDE212F8ECD}"/>
+              </a:ext>
+            </a:extLst>
+          </p:cNvPr>
+          <p:cNvSpPr txBox="1"/>
+          <p:nvPr/>
+        </p:nvSpPr>
+        <p:spPr>
+          <a:xfrm>
+            <a:off x="-85806" y="794082"/>
+            <a:ext cx="670983" cy="261610"/>
+          </a:xfrm>
+          <a:prstGeom prst="rect">
+            <a:avLst/>
+          </a:prstGeom>
+          <a:noFill/>
+        </p:spPr>
+        <p:txBody>
+          <a:bodyPr wrap="square" rtlCol="0">
+            <a:spAutoFit/>
+          </a:bodyPr>
+          <a:lstStyle/>
+          <a:p>
+            <a:pPr algn="ctr"/>
+            <a:r>
+              <a:rPr lang="en-US" altLang="ko-KR" sz="1100" b="1" dirty="0">
+                <a:latin typeface="helvetica" panose="020B0604020202020204" pitchFamily="34" charset="0"/>
+                <a:cs typeface="helvetica" panose="020B0604020202020204" pitchFamily="34" charset="0"/>
+              </a:rPr>
+              <a:t>Singlet</a:t>
+            </a:r>
+            <a:endParaRPr lang="ko-KR" altLang="en-US" sz="1100" b="1" dirty="0">
+              <a:latin typeface="helvetica" panose="020B0604020202020204" pitchFamily="34" charset="0"/>
+              <a:cs typeface="helvetica" panose="020B0604020202020204" pitchFamily="34" charset="0"/>
+            </a:endParaRPr>
+          </a:p>
+        </p:txBody>
+      </p:sp>
+      <p:sp>
+        <p:nvSpPr>
+          <p:cNvPr id="7" name="TextBox 6">
+            <a:extLst>
+              <a:ext uri="{FF2B5EF4-FFF2-40B4-BE49-F238E27FC236}">
+                <a16:creationId xmlns:a16="http://schemas.microsoft.com/office/drawing/2014/main" id="{0FF46201-A366-4A3C-BE03-4A96D4A4D989}"/>
+              </a:ext>
+            </a:extLst>
+          </p:cNvPr>
+          <p:cNvSpPr txBox="1"/>
+          <p:nvPr/>
+        </p:nvSpPr>
+        <p:spPr>
+          <a:xfrm>
+            <a:off x="-85806" y="2342781"/>
+            <a:ext cx="670983" cy="261610"/>
+          </a:xfrm>
+          <a:prstGeom prst="rect">
+            <a:avLst/>
+          </a:prstGeom>
+          <a:noFill/>
+        </p:spPr>
+        <p:txBody>
+          <a:bodyPr wrap="square" rtlCol="0">
+            <a:spAutoFit/>
+          </a:bodyPr>
+          <a:lstStyle/>
+          <a:p>
+            <a:pPr algn="ctr"/>
+            <a:r>
+              <a:rPr lang="en-US" altLang="ko-KR" sz="1100" b="1" dirty="0">
+                <a:latin typeface="helvetica" panose="020B0604020202020204" pitchFamily="34" charset="0"/>
+                <a:cs typeface="helvetica" panose="020B0604020202020204" pitchFamily="34" charset="0"/>
+              </a:rPr>
+              <a:t>Ours</a:t>
+            </a:r>
+            <a:endParaRPr lang="ko-KR" altLang="en-US" sz="1100" b="1" dirty="0">
+              <a:latin typeface="helvetica" panose="020B0604020202020204" pitchFamily="34" charset="0"/>
+              <a:cs typeface="helvetica" panose="020B0604020202020204" pitchFamily="34" charset="0"/>
+            </a:endParaRPr>
+          </a:p>
+        </p:txBody>
+      </p:sp>
       <p:cxnSp>
         <p:nvCxnSpPr>
           <p:cNvPr id="32" name="직선 화살표 연결선 31">
@@ -2697,7 +2697,7 @@
         </p:nvCxnSpPr>
         <p:spPr>
           <a:xfrm flipV="1">
-            <a:off x="523213" y="176034"/>
+            <a:off x="524027" y="172574"/>
             <a:ext cx="1496291" cy="1496291"/>
           </a:xfrm>
           <a:prstGeom prst="straightConnector1">
@@ -2726,8 +2726,8 @@
           </a:fontRef>
         </p:style>
       </p:cxnSp>
-      <mc:AlternateContent xmlns:mc="http://schemas.openxmlformats.org/markup-compatibility/2006">
-        <mc:Choice xmlns:a14="http://schemas.microsoft.com/office/drawing/2010/main" Requires="a14">
+      <mc:AlternateContent xmlns:mc="http://schemas.openxmlformats.org/markup-compatibility/2006" xmlns:a14="http://schemas.microsoft.com/office/drawing/2010/main">
+        <mc:Choice Requires="a14">
           <p:sp>
             <p:nvSpPr>
               <p:cNvPr id="33" name="TextBox 32">
@@ -2771,17 +2771,7 @@
                           <a:latin typeface="Cambria Math" panose="02040503050406030204" pitchFamily="18" charset="0"/>
                           <a:cs typeface="helvetica" panose="020B0604020202020204" pitchFamily="34" charset="0"/>
                         </a:rPr>
-                        <m:t>𝟏𝟎</m:t>
-                      </m:r>
-                      <m:r>
-                        <a:rPr lang="en-US" altLang="ko-KR" sz="1000" b="1" i="1" dirty="0" smtClean="0">
-                          <a:solidFill>
-                            <a:schemeClr val="bg1"/>
-                          </a:solidFill>
-                          <a:latin typeface="Cambria Math" panose="02040503050406030204" pitchFamily="18" charset="0"/>
-                          <a:cs typeface="helvetica" panose="020B0604020202020204" pitchFamily="34" charset="0"/>
-                        </a:rPr>
-                        <m:t>𝟎</m:t>
+                        <m:t>𝟏𝟎𝟎</m:t>
                       </m:r>
                       <m:r>
                         <a:rPr lang="en-US" altLang="ko-KR" sz="1000" b="1" i="1" dirty="0" smtClean="0">
@@ -2807,7 +2797,7 @@
             </p:txBody>
           </p:sp>
         </mc:Choice>
-        <mc:Fallback>
+        <mc:Fallback xmlns="">
           <p:sp>
             <p:nvSpPr>
               <p:cNvPr id="33" name="TextBox 32">

</xml_diff>

<commit_message>
Deploying to gh-pages from @ YoungJIn94/YoungJIn94.github.io@e3d34c7f153b49146bdbff68a44ac20e9a3aa936 🚀
</commit_message>
<xml_diff>
--- a/assets/img/publication_preview/E2ECamera.pptx
+++ b/assets/img/publication_preview/E2ECamera.pptx
@@ -10,7 +10,7 @@
   <p:sldIdLst>
     <p:sldId id="256" r:id="rId2"/>
   </p:sldIdLst>
-  <p:sldSz cx="3600450" cy="3240088"/>
+  <p:sldSz cx="3419475" cy="3240088"/>
   <p:notesSz cx="7772400" cy="10058400"/>
   <p:defaultTextStyle>
     <a:defPPr>
@@ -197,7 +197,7 @@
           <a:p>
             <a:fld id="{0903332B-846A-4D2B-8B67-F9309C5158BD}" type="datetimeFigureOut">
               <a:rPr lang="ko-KR" altLang="en-US" smtClean="0"/>
-              <a:t>2025-02-19</a:t>
+              <a:t>2025-02-20</a:t>
             </a:fld>
             <a:endParaRPr lang="ko-KR" altLang="en-US"/>
           </a:p>
@@ -215,8 +215,8 @@
         </p:nvSpPr>
         <p:spPr>
           <a:xfrm>
-            <a:off x="2001838" y="1257300"/>
-            <a:ext cx="3768725" cy="3394075"/>
+            <a:off x="2095500" y="1257300"/>
+            <a:ext cx="3581400" cy="3394075"/>
           </a:xfrm>
           <a:prstGeom prst="rect">
             <a:avLst/>
@@ -493,8 +493,8 @@
         </p:nvSpPr>
         <p:spPr>
           <a:xfrm>
-            <a:off x="2001838" y="1257300"/>
-            <a:ext cx="3768725" cy="3394075"/>
+            <a:off x="2095500" y="1257300"/>
+            <a:ext cx="3581400" cy="3394075"/>
           </a:xfrm>
         </p:spPr>
       </p:sp>
@@ -607,8 +607,8 @@
         </p:nvSpPr>
         <p:spPr>
           <a:xfrm>
-            <a:off x="180029" y="129263"/>
-            <a:ext cx="3240263" cy="540865"/>
+            <a:off x="170980" y="129264"/>
+            <a:ext cx="3077393" cy="540865"/>
           </a:xfrm>
           <a:prstGeom prst="rect">
             <a:avLst/>
@@ -637,8 +637,8 @@
         </p:nvSpPr>
         <p:spPr>
           <a:xfrm>
-            <a:off x="180029" y="758067"/>
-            <a:ext cx="3240263" cy="896169"/>
+            <a:off x="170980" y="758068"/>
+            <a:ext cx="3077393" cy="896169"/>
           </a:xfrm>
           <a:prstGeom prst="rect">
             <a:avLst/>
@@ -668,8 +668,8 @@
         </p:nvSpPr>
         <p:spPr>
           <a:xfrm>
-            <a:off x="180029" y="1739617"/>
-            <a:ext cx="3240263" cy="896169"/>
+            <a:off x="170980" y="1739618"/>
+            <a:ext cx="3077393" cy="896169"/>
           </a:xfrm>
           <a:prstGeom prst="rect">
             <a:avLst/>
@@ -724,8 +724,8 @@
         </p:nvSpPr>
         <p:spPr>
           <a:xfrm>
-            <a:off x="180029" y="129263"/>
-            <a:ext cx="3240263" cy="540865"/>
+            <a:off x="170980" y="129264"/>
+            <a:ext cx="3077393" cy="540865"/>
           </a:xfrm>
           <a:prstGeom prst="rect">
             <a:avLst/>
@@ -754,8 +754,8 @@
         </p:nvSpPr>
         <p:spPr>
           <a:xfrm>
-            <a:off x="180024" y="758067"/>
-            <a:ext cx="1581221" cy="896169"/>
+            <a:off x="170975" y="758068"/>
+            <a:ext cx="1501742" cy="896169"/>
           </a:xfrm>
           <a:prstGeom prst="rect">
             <a:avLst/>
@@ -785,8 +785,8 @@
         </p:nvSpPr>
         <p:spPr>
           <a:xfrm>
-            <a:off x="1840486" y="758067"/>
-            <a:ext cx="1581221" cy="896169"/>
+            <a:off x="1747975" y="758068"/>
+            <a:ext cx="1501742" cy="896169"/>
           </a:xfrm>
           <a:prstGeom prst="rect">
             <a:avLst/>
@@ -816,8 +816,8 @@
         </p:nvSpPr>
         <p:spPr>
           <a:xfrm>
-            <a:off x="180024" y="1739617"/>
-            <a:ext cx="1581221" cy="896169"/>
+            <a:off x="170975" y="1739618"/>
+            <a:ext cx="1501742" cy="896169"/>
           </a:xfrm>
           <a:prstGeom prst="rect">
             <a:avLst/>
@@ -847,8 +847,8 @@
         </p:nvSpPr>
         <p:spPr>
           <a:xfrm>
-            <a:off x="1840486" y="1739617"/>
-            <a:ext cx="1581221" cy="896169"/>
+            <a:off x="1747975" y="1739618"/>
+            <a:ext cx="1501742" cy="896169"/>
           </a:xfrm>
           <a:prstGeom prst="rect">
             <a:avLst/>
@@ -903,8 +903,8 @@
         </p:nvSpPr>
         <p:spPr>
           <a:xfrm>
-            <a:off x="180029" y="129263"/>
-            <a:ext cx="3240263" cy="540865"/>
+            <a:off x="170980" y="129264"/>
+            <a:ext cx="3077393" cy="540865"/>
           </a:xfrm>
           <a:prstGeom prst="rect">
             <a:avLst/>
@@ -933,8 +933,8 @@
         </p:nvSpPr>
         <p:spPr>
           <a:xfrm>
-            <a:off x="180022" y="758067"/>
-            <a:ext cx="1043280" cy="896169"/>
+            <a:off x="170973" y="758068"/>
+            <a:ext cx="990840" cy="896169"/>
           </a:xfrm>
           <a:prstGeom prst="rect">
             <a:avLst/>
@@ -964,8 +964,8 @@
         </p:nvSpPr>
         <p:spPr>
           <a:xfrm>
-            <a:off x="1275608" y="758067"/>
-            <a:ext cx="1043280" cy="896169"/>
+            <a:off x="1211490" y="758068"/>
+            <a:ext cx="990840" cy="896169"/>
           </a:xfrm>
           <a:prstGeom prst="rect">
             <a:avLst/>
@@ -995,8 +995,8 @@
         </p:nvSpPr>
         <p:spPr>
           <a:xfrm>
-            <a:off x="2371194" y="758067"/>
-            <a:ext cx="1043280" cy="896169"/>
+            <a:off x="2252007" y="758068"/>
+            <a:ext cx="990840" cy="896169"/>
           </a:xfrm>
           <a:prstGeom prst="rect">
             <a:avLst/>
@@ -1026,8 +1026,8 @@
         </p:nvSpPr>
         <p:spPr>
           <a:xfrm>
-            <a:off x="180022" y="1739617"/>
-            <a:ext cx="1043280" cy="896169"/>
+            <a:off x="170973" y="1739618"/>
+            <a:ext cx="990840" cy="896169"/>
           </a:xfrm>
           <a:prstGeom prst="rect">
             <a:avLst/>
@@ -1057,8 +1057,8 @@
         </p:nvSpPr>
         <p:spPr>
           <a:xfrm>
-            <a:off x="1275608" y="1739617"/>
-            <a:ext cx="1043280" cy="896169"/>
+            <a:off x="1211490" y="1739618"/>
+            <a:ext cx="990840" cy="896169"/>
           </a:xfrm>
           <a:prstGeom prst="rect">
             <a:avLst/>
@@ -1088,8 +1088,8 @@
         </p:nvSpPr>
         <p:spPr>
           <a:xfrm>
-            <a:off x="2371194" y="1739617"/>
-            <a:ext cx="1043280" cy="896169"/>
+            <a:off x="2252007" y="1739618"/>
+            <a:ext cx="990840" cy="896169"/>
           </a:xfrm>
           <a:prstGeom prst="rect">
             <a:avLst/>
@@ -1144,8 +1144,8 @@
         </p:nvSpPr>
         <p:spPr>
           <a:xfrm>
-            <a:off x="180029" y="129263"/>
-            <a:ext cx="3240263" cy="540865"/>
+            <a:off x="170980" y="129264"/>
+            <a:ext cx="3077393" cy="540865"/>
           </a:xfrm>
           <a:prstGeom prst="rect">
             <a:avLst/>
@@ -1174,8 +1174,8 @@
         </p:nvSpPr>
         <p:spPr>
           <a:xfrm>
-            <a:off x="180029" y="758067"/>
-            <a:ext cx="3240263" cy="1879081"/>
+            <a:off x="170980" y="758068"/>
+            <a:ext cx="3077393" cy="1879081"/>
           </a:xfrm>
           <a:prstGeom prst="rect">
             <a:avLst/>
@@ -1229,8 +1229,8 @@
         </p:nvSpPr>
         <p:spPr>
           <a:xfrm>
-            <a:off x="180029" y="129263"/>
-            <a:ext cx="3240263" cy="540865"/>
+            <a:off x="170980" y="129264"/>
+            <a:ext cx="3077393" cy="540865"/>
           </a:xfrm>
           <a:prstGeom prst="rect">
             <a:avLst/>
@@ -1259,8 +1259,8 @@
         </p:nvSpPr>
         <p:spPr>
           <a:xfrm>
-            <a:off x="180029" y="758067"/>
-            <a:ext cx="3240263" cy="1879081"/>
+            <a:off x="170980" y="758068"/>
+            <a:ext cx="3077393" cy="1879081"/>
           </a:xfrm>
           <a:prstGeom prst="rect">
             <a:avLst/>
@@ -1315,8 +1315,8 @@
         </p:nvSpPr>
         <p:spPr>
           <a:xfrm>
-            <a:off x="180029" y="129263"/>
-            <a:ext cx="3240263" cy="540865"/>
+            <a:off x="170980" y="129264"/>
+            <a:ext cx="3077393" cy="540865"/>
           </a:xfrm>
           <a:prstGeom prst="rect">
             <a:avLst/>
@@ -1345,8 +1345,8 @@
         </p:nvSpPr>
         <p:spPr>
           <a:xfrm>
-            <a:off x="180024" y="758067"/>
-            <a:ext cx="1581221" cy="1879081"/>
+            <a:off x="170975" y="758068"/>
+            <a:ext cx="1501742" cy="1879081"/>
           </a:xfrm>
           <a:prstGeom prst="rect">
             <a:avLst/>
@@ -1376,8 +1376,8 @@
         </p:nvSpPr>
         <p:spPr>
           <a:xfrm>
-            <a:off x="1840486" y="758067"/>
-            <a:ext cx="1581221" cy="1879081"/>
+            <a:off x="1747975" y="758068"/>
+            <a:ext cx="1501742" cy="1879081"/>
           </a:xfrm>
           <a:prstGeom prst="rect">
             <a:avLst/>
@@ -1432,8 +1432,8 @@
         </p:nvSpPr>
         <p:spPr>
           <a:xfrm>
-            <a:off x="180029" y="129263"/>
-            <a:ext cx="3240263" cy="540865"/>
+            <a:off x="170980" y="129264"/>
+            <a:ext cx="3077393" cy="540865"/>
           </a:xfrm>
           <a:prstGeom prst="rect">
             <a:avLst/>
@@ -1487,8 +1487,8 @@
         </p:nvSpPr>
         <p:spPr>
           <a:xfrm>
-            <a:off x="180029" y="129270"/>
-            <a:ext cx="3240263" cy="2507709"/>
+            <a:off x="170980" y="129271"/>
+            <a:ext cx="3077393" cy="2507709"/>
           </a:xfrm>
           <a:prstGeom prst="rect">
             <a:avLst/>
@@ -1542,8 +1542,8 @@
         </p:nvSpPr>
         <p:spPr>
           <a:xfrm>
-            <a:off x="180029" y="129263"/>
-            <a:ext cx="3240263" cy="540865"/>
+            <a:off x="170980" y="129264"/>
+            <a:ext cx="3077393" cy="540865"/>
           </a:xfrm>
           <a:prstGeom prst="rect">
             <a:avLst/>
@@ -1572,8 +1572,8 @@
         </p:nvSpPr>
         <p:spPr>
           <a:xfrm>
-            <a:off x="180024" y="758067"/>
-            <a:ext cx="1581221" cy="896169"/>
+            <a:off x="170975" y="758068"/>
+            <a:ext cx="1501742" cy="896169"/>
           </a:xfrm>
           <a:prstGeom prst="rect">
             <a:avLst/>
@@ -1603,8 +1603,8 @@
         </p:nvSpPr>
         <p:spPr>
           <a:xfrm>
-            <a:off x="1840486" y="758067"/>
-            <a:ext cx="1581221" cy="1879081"/>
+            <a:off x="1747975" y="758068"/>
+            <a:ext cx="1501742" cy="1879081"/>
           </a:xfrm>
           <a:prstGeom prst="rect">
             <a:avLst/>
@@ -1634,8 +1634,8 @@
         </p:nvSpPr>
         <p:spPr>
           <a:xfrm>
-            <a:off x="180024" y="1739617"/>
-            <a:ext cx="1581221" cy="896169"/>
+            <a:off x="170975" y="1739618"/>
+            <a:ext cx="1501742" cy="896169"/>
           </a:xfrm>
           <a:prstGeom prst="rect">
             <a:avLst/>
@@ -1690,8 +1690,8 @@
         </p:nvSpPr>
         <p:spPr>
           <a:xfrm>
-            <a:off x="180029" y="129263"/>
-            <a:ext cx="3240263" cy="540865"/>
+            <a:off x="170980" y="129264"/>
+            <a:ext cx="3077393" cy="540865"/>
           </a:xfrm>
           <a:prstGeom prst="rect">
             <a:avLst/>
@@ -1720,8 +1720,8 @@
         </p:nvSpPr>
         <p:spPr>
           <a:xfrm>
-            <a:off x="180024" y="758067"/>
-            <a:ext cx="1581221" cy="1879081"/>
+            <a:off x="170975" y="758068"/>
+            <a:ext cx="1501742" cy="1879081"/>
           </a:xfrm>
           <a:prstGeom prst="rect">
             <a:avLst/>
@@ -1751,8 +1751,8 @@
         </p:nvSpPr>
         <p:spPr>
           <a:xfrm>
-            <a:off x="1840486" y="758067"/>
-            <a:ext cx="1581221" cy="896169"/>
+            <a:off x="1747975" y="758068"/>
+            <a:ext cx="1501742" cy="896169"/>
           </a:xfrm>
           <a:prstGeom prst="rect">
             <a:avLst/>
@@ -1782,8 +1782,8 @@
         </p:nvSpPr>
         <p:spPr>
           <a:xfrm>
-            <a:off x="1840486" y="1739617"/>
-            <a:ext cx="1581221" cy="896169"/>
+            <a:off x="1747975" y="1739618"/>
+            <a:ext cx="1501742" cy="896169"/>
           </a:xfrm>
           <a:prstGeom prst="rect">
             <a:avLst/>
@@ -1838,8 +1838,8 @@
         </p:nvSpPr>
         <p:spPr>
           <a:xfrm>
-            <a:off x="180029" y="129263"/>
-            <a:ext cx="3240263" cy="540865"/>
+            <a:off x="170980" y="129264"/>
+            <a:ext cx="3077393" cy="540865"/>
           </a:xfrm>
           <a:prstGeom prst="rect">
             <a:avLst/>
@@ -1868,8 +1868,8 @@
         </p:nvSpPr>
         <p:spPr>
           <a:xfrm>
-            <a:off x="180024" y="758067"/>
-            <a:ext cx="1581221" cy="896169"/>
+            <a:off x="170975" y="758068"/>
+            <a:ext cx="1501742" cy="896169"/>
           </a:xfrm>
           <a:prstGeom prst="rect">
             <a:avLst/>
@@ -1899,8 +1899,8 @@
         </p:nvSpPr>
         <p:spPr>
           <a:xfrm>
-            <a:off x="1840486" y="758067"/>
-            <a:ext cx="1581221" cy="896169"/>
+            <a:off x="1747975" y="758068"/>
+            <a:ext cx="1501742" cy="896169"/>
           </a:xfrm>
           <a:prstGeom prst="rect">
             <a:avLst/>
@@ -1930,8 +1930,8 @@
         </p:nvSpPr>
         <p:spPr>
           <a:xfrm>
-            <a:off x="180029" y="1739617"/>
-            <a:ext cx="3240263" cy="896169"/>
+            <a:off x="170980" y="1739618"/>
+            <a:ext cx="3077393" cy="896169"/>
           </a:xfrm>
           <a:prstGeom prst="rect">
             <a:avLst/>
@@ -1991,7 +1991,7 @@
         <p:spPr>
           <a:xfrm>
             <a:off x="0" y="4"/>
-            <a:ext cx="56700" cy="3240088"/>
+            <a:ext cx="53850" cy="3240088"/>
           </a:xfrm>
           <a:prstGeom prst="rect">
             <a:avLst/>
@@ -2025,7 +2025,7 @@
         <p:spPr>
           <a:xfrm>
             <a:off x="0" y="8"/>
-            <a:ext cx="56700" cy="566208"/>
+            <a:ext cx="53850" cy="566208"/>
           </a:xfrm>
           <a:prstGeom prst="rect">
             <a:avLst/>
@@ -2367,481 +2367,536 @@
           <a:chExt cx="0" cy="0"/>
         </a:xfrm>
       </p:grpSpPr>
-      <p:pic>
-        <p:nvPicPr>
-          <p:cNvPr id="8" name="그림 7">
+      <p:grpSp>
+        <p:nvGrpSpPr>
+          <p:cNvPr id="13" name="그룹 12">
             <a:extLst>
               <a:ext uri="{FF2B5EF4-FFF2-40B4-BE49-F238E27FC236}">
-                <a16:creationId xmlns:a16="http://schemas.microsoft.com/office/drawing/2014/main" id="{72DE56F5-5193-4D83-94C4-8837A2B8F5D6}"/>
+                <a16:creationId xmlns:a16="http://schemas.microsoft.com/office/drawing/2014/main" id="{5C361566-B6CB-47C4-89B9-38F6F2D8A3DF}"/>
               </a:ext>
             </a:extLst>
           </p:cNvPr>
-          <p:cNvPicPr>
-            <a:picLocks/>
-          </p:cNvPicPr>
+          <p:cNvGrpSpPr/>
           <p:nvPr/>
-        </p:nvPicPr>
-        <p:blipFill>
-          <a:blip r:embed="rId3">
-            <a:extLst>
-              <a:ext uri="{28A0092B-C50C-407E-A947-70E740481C1C}">
-                <a14:useLocalDpi xmlns:a14="http://schemas.microsoft.com/office/drawing/2010/main" val="0"/>
-              </a:ext>
-            </a:extLst>
-          </a:blip>
-          <a:stretch>
-            <a:fillRect/>
-          </a:stretch>
-        </p:blipFill>
-        <p:spPr>
-          <a:xfrm>
-            <a:off x="2064000" y="1706601"/>
-            <a:ext cx="1512000" cy="1512000"/>
-          </a:xfrm>
-          <a:prstGeom prst="rect">
-            <a:avLst/>
-          </a:prstGeom>
-        </p:spPr>
-      </p:pic>
-      <p:pic>
-        <p:nvPicPr>
-          <p:cNvPr id="10" name="그림 9">
-            <a:extLst>
-              <a:ext uri="{FF2B5EF4-FFF2-40B4-BE49-F238E27FC236}">
-                <a16:creationId xmlns:a16="http://schemas.microsoft.com/office/drawing/2014/main" id="{E06D5577-C201-490E-BFB7-89F6B4C571B7}"/>
-              </a:ext>
-            </a:extLst>
-          </p:cNvPr>
-          <p:cNvPicPr>
-            <a:picLocks/>
-          </p:cNvPicPr>
-          <p:nvPr/>
-        </p:nvPicPr>
-        <p:blipFill>
-          <a:blip r:embed="rId4">
-            <a:extLst>
-              <a:ext uri="{28A0092B-C50C-407E-A947-70E740481C1C}">
-                <a14:useLocalDpi xmlns:a14="http://schemas.microsoft.com/office/drawing/2010/main" val="0"/>
-              </a:ext>
-            </a:extLst>
-          </a:blip>
-          <a:stretch>
-            <a:fillRect/>
-          </a:stretch>
-        </p:blipFill>
-        <p:spPr>
-          <a:xfrm>
-            <a:off x="516172" y="1706601"/>
-            <a:ext cx="1512000" cy="1512000"/>
-          </a:xfrm>
-          <a:prstGeom prst="rect">
-            <a:avLst/>
-          </a:prstGeom>
-        </p:spPr>
-      </p:pic>
-      <p:pic>
-        <p:nvPicPr>
-          <p:cNvPr id="12" name="그림 11">
-            <a:extLst>
-              <a:ext uri="{FF2B5EF4-FFF2-40B4-BE49-F238E27FC236}">
-                <a16:creationId xmlns:a16="http://schemas.microsoft.com/office/drawing/2014/main" id="{5E7EDF87-0293-48F4-9ACB-81DD0B6B623C}"/>
-              </a:ext>
-            </a:extLst>
-          </p:cNvPr>
-          <p:cNvPicPr>
-            <a:picLocks/>
-          </p:cNvPicPr>
-          <p:nvPr/>
-        </p:nvPicPr>
-        <p:blipFill>
-          <a:blip r:embed="rId5">
-            <a:extLst>
-              <a:ext uri="{28A0092B-C50C-407E-A947-70E740481C1C}">
-                <a14:useLocalDpi xmlns:a14="http://schemas.microsoft.com/office/drawing/2010/main" val="0"/>
-              </a:ext>
-            </a:extLst>
-          </a:blip>
-          <a:stretch>
-            <a:fillRect/>
-          </a:stretch>
-        </p:blipFill>
-        <p:spPr>
-          <a:xfrm>
-            <a:off x="2064000" y="164719"/>
-            <a:ext cx="1512000" cy="1512000"/>
-          </a:xfrm>
-          <a:prstGeom prst="rect">
-            <a:avLst/>
-          </a:prstGeom>
-        </p:spPr>
-      </p:pic>
-      <p:pic>
-        <p:nvPicPr>
-          <p:cNvPr id="14" name="그림 13">
-            <a:extLst>
-              <a:ext uri="{FF2B5EF4-FFF2-40B4-BE49-F238E27FC236}">
-                <a16:creationId xmlns:a16="http://schemas.microsoft.com/office/drawing/2014/main" id="{3F49710F-A9F8-47EF-9C38-0307CE041284}"/>
-              </a:ext>
-            </a:extLst>
-          </p:cNvPr>
-          <p:cNvPicPr>
-            <a:picLocks/>
-          </p:cNvPicPr>
-          <p:nvPr/>
-        </p:nvPicPr>
-        <p:blipFill>
-          <a:blip r:embed="rId6">
-            <a:extLst>
-              <a:ext uri="{28A0092B-C50C-407E-A947-70E740481C1C}">
-                <a14:useLocalDpi xmlns:a14="http://schemas.microsoft.com/office/drawing/2010/main" val="0"/>
-              </a:ext>
-            </a:extLst>
-          </a:blip>
-          <a:stretch>
-            <a:fillRect/>
-          </a:stretch>
-        </p:blipFill>
-        <p:spPr>
-          <a:xfrm>
-            <a:off x="516172" y="164719"/>
-            <a:ext cx="1512000" cy="1512000"/>
-          </a:xfrm>
-          <a:prstGeom prst="rect">
-            <a:avLst/>
-          </a:prstGeom>
-        </p:spPr>
-      </p:pic>
-      <p:sp>
-        <p:nvSpPr>
-          <p:cNvPr id="4" name="TextBox 3">
-            <a:extLst>
-              <a:ext uri="{FF2B5EF4-FFF2-40B4-BE49-F238E27FC236}">
-                <a16:creationId xmlns:a16="http://schemas.microsoft.com/office/drawing/2014/main" id="{9D20D69F-357C-4908-A803-397CD34418DA}"/>
-              </a:ext>
-            </a:extLst>
-          </p:cNvPr>
-          <p:cNvSpPr txBox="1"/>
-          <p:nvPr/>
-        </p:nvSpPr>
-        <p:spPr>
-          <a:xfrm>
-            <a:off x="701349" y="-36209"/>
-            <a:ext cx="1141647" cy="261610"/>
-          </a:xfrm>
-          <a:prstGeom prst="rect">
-            <a:avLst/>
-          </a:prstGeom>
-          <a:noFill/>
-        </p:spPr>
-        <p:txBody>
-          <a:bodyPr wrap="square" rtlCol="0">
-            <a:spAutoFit/>
-          </a:bodyPr>
-          <a:lstStyle/>
-          <a:p>
-            <a:pPr algn="ctr"/>
-            <a:r>
-              <a:rPr lang="en-US" altLang="ko-KR" sz="1100" b="1" dirty="0">
-                <a:latin typeface="helvetica" panose="020B0604020202020204" pitchFamily="34" charset="0"/>
-                <a:cs typeface="helvetica" panose="020B0604020202020204" pitchFamily="34" charset="0"/>
-              </a:rPr>
-              <a:t>Raw</a:t>
-            </a:r>
-            <a:endParaRPr lang="ko-KR" altLang="en-US" sz="1100" b="1" dirty="0">
-              <a:latin typeface="helvetica" panose="020B0604020202020204" pitchFamily="34" charset="0"/>
-              <a:cs typeface="helvetica" panose="020B0604020202020204" pitchFamily="34" charset="0"/>
-            </a:endParaRPr>
-          </a:p>
-        </p:txBody>
-      </p:sp>
-      <p:sp>
-        <p:nvSpPr>
-          <p:cNvPr id="5" name="TextBox 4">
-            <a:extLst>
-              <a:ext uri="{FF2B5EF4-FFF2-40B4-BE49-F238E27FC236}">
-                <a16:creationId xmlns:a16="http://schemas.microsoft.com/office/drawing/2014/main" id="{C89DE598-7CAB-4474-AAE1-818256996A53}"/>
-              </a:ext>
-            </a:extLst>
-          </p:cNvPr>
-          <p:cNvSpPr txBox="1"/>
-          <p:nvPr/>
-        </p:nvSpPr>
-        <p:spPr>
-          <a:xfrm>
-            <a:off x="2199998" y="-47030"/>
-            <a:ext cx="1240004" cy="261610"/>
-          </a:xfrm>
-          <a:prstGeom prst="rect">
-            <a:avLst/>
-          </a:prstGeom>
-          <a:noFill/>
-        </p:spPr>
-        <p:txBody>
-          <a:bodyPr wrap="square" rtlCol="0">
-            <a:spAutoFit/>
-          </a:bodyPr>
-          <a:lstStyle/>
-          <a:p>
-            <a:pPr algn="ctr"/>
-            <a:r>
-              <a:rPr lang="en-US" altLang="ko-KR" sz="1100" b="1" dirty="0">
-                <a:latin typeface="helvetica" panose="020B0604020202020204" pitchFamily="34" charset="0"/>
-                <a:cs typeface="helvetica" panose="020B0604020202020204" pitchFamily="34" charset="0"/>
-              </a:rPr>
-              <a:t>Reconstructed</a:t>
-            </a:r>
-            <a:endParaRPr lang="ko-KR" altLang="en-US" sz="1100" b="1" dirty="0">
-              <a:latin typeface="helvetica" panose="020B0604020202020204" pitchFamily="34" charset="0"/>
-              <a:cs typeface="helvetica" panose="020B0604020202020204" pitchFamily="34" charset="0"/>
-            </a:endParaRPr>
-          </a:p>
-        </p:txBody>
-      </p:sp>
-      <p:sp>
-        <p:nvSpPr>
-          <p:cNvPr id="6" name="TextBox 5">
-            <a:extLst>
-              <a:ext uri="{FF2B5EF4-FFF2-40B4-BE49-F238E27FC236}">
-                <a16:creationId xmlns:a16="http://schemas.microsoft.com/office/drawing/2014/main" id="{0E14188E-BA84-4CF2-A5C2-7BDE212F8ECD}"/>
-              </a:ext>
-            </a:extLst>
-          </p:cNvPr>
-          <p:cNvSpPr txBox="1"/>
-          <p:nvPr/>
-        </p:nvSpPr>
-        <p:spPr>
-          <a:xfrm>
-            <a:off x="-85806" y="794082"/>
-            <a:ext cx="670983" cy="261610"/>
-          </a:xfrm>
-          <a:prstGeom prst="rect">
-            <a:avLst/>
-          </a:prstGeom>
-          <a:noFill/>
-        </p:spPr>
-        <p:txBody>
-          <a:bodyPr wrap="square" rtlCol="0">
-            <a:spAutoFit/>
-          </a:bodyPr>
-          <a:lstStyle/>
-          <a:p>
-            <a:pPr algn="ctr"/>
-            <a:r>
-              <a:rPr lang="en-US" altLang="ko-KR" sz="1100" b="1" dirty="0">
-                <a:latin typeface="helvetica" panose="020B0604020202020204" pitchFamily="34" charset="0"/>
-                <a:cs typeface="helvetica" panose="020B0604020202020204" pitchFamily="34" charset="0"/>
-              </a:rPr>
-              <a:t>Singlet</a:t>
-            </a:r>
-            <a:endParaRPr lang="ko-KR" altLang="en-US" sz="1100" b="1" dirty="0">
-              <a:latin typeface="helvetica" panose="020B0604020202020204" pitchFamily="34" charset="0"/>
-              <a:cs typeface="helvetica" panose="020B0604020202020204" pitchFamily="34" charset="0"/>
-            </a:endParaRPr>
-          </a:p>
-        </p:txBody>
-      </p:sp>
-      <p:sp>
-        <p:nvSpPr>
-          <p:cNvPr id="7" name="TextBox 6">
-            <a:extLst>
-              <a:ext uri="{FF2B5EF4-FFF2-40B4-BE49-F238E27FC236}">
-                <a16:creationId xmlns:a16="http://schemas.microsoft.com/office/drawing/2014/main" id="{0FF46201-A366-4A3C-BE03-4A96D4A4D989}"/>
-              </a:ext>
-            </a:extLst>
-          </p:cNvPr>
-          <p:cNvSpPr txBox="1"/>
-          <p:nvPr/>
-        </p:nvSpPr>
-        <p:spPr>
-          <a:xfrm>
-            <a:off x="-85806" y="2342781"/>
-            <a:ext cx="670983" cy="261610"/>
-          </a:xfrm>
-          <a:prstGeom prst="rect">
-            <a:avLst/>
-          </a:prstGeom>
-          <a:noFill/>
-        </p:spPr>
-        <p:txBody>
-          <a:bodyPr wrap="square" rtlCol="0">
-            <a:spAutoFit/>
-          </a:bodyPr>
-          <a:lstStyle/>
-          <a:p>
-            <a:pPr algn="ctr"/>
-            <a:r>
-              <a:rPr lang="en-US" altLang="ko-KR" sz="1100" b="1" dirty="0">
-                <a:latin typeface="helvetica" panose="020B0604020202020204" pitchFamily="34" charset="0"/>
-                <a:cs typeface="helvetica" panose="020B0604020202020204" pitchFamily="34" charset="0"/>
-              </a:rPr>
-              <a:t>Ours</a:t>
-            </a:r>
-            <a:endParaRPr lang="ko-KR" altLang="en-US" sz="1100" b="1" dirty="0">
-              <a:latin typeface="helvetica" panose="020B0604020202020204" pitchFamily="34" charset="0"/>
-              <a:cs typeface="helvetica" panose="020B0604020202020204" pitchFamily="34" charset="0"/>
-            </a:endParaRPr>
-          </a:p>
-        </p:txBody>
-      </p:sp>
-      <p:cxnSp>
-        <p:nvCxnSpPr>
-          <p:cNvPr id="32" name="직선 화살표 연결선 31">
-            <a:extLst>
-              <a:ext uri="{FF2B5EF4-FFF2-40B4-BE49-F238E27FC236}">
-                <a16:creationId xmlns:a16="http://schemas.microsoft.com/office/drawing/2014/main" id="{6AA4DDAD-7718-4CD2-89BE-070969DE556F}"/>
-              </a:ext>
-            </a:extLst>
-          </p:cNvPr>
-          <p:cNvCxnSpPr/>
-          <p:nvPr/>
-        </p:nvCxnSpPr>
-        <p:spPr>
-          <a:xfrm flipV="1">
-            <a:off x="524027" y="172574"/>
-            <a:ext cx="1496291" cy="1496291"/>
-          </a:xfrm>
-          <a:prstGeom prst="straightConnector1">
-            <a:avLst/>
-          </a:prstGeom>
-          <a:ln>
-            <a:solidFill>
-              <a:schemeClr val="bg1"/>
-            </a:solidFill>
-            <a:headEnd type="stealth"/>
-            <a:tailEnd type="stealth"/>
-          </a:ln>
-        </p:spPr>
-        <p:style>
-          <a:lnRef idx="1">
-            <a:schemeClr val="accent1"/>
-          </a:lnRef>
-          <a:fillRef idx="0">
-            <a:schemeClr val="accent1"/>
-          </a:fillRef>
-          <a:effectRef idx="0">
-            <a:schemeClr val="accent1"/>
-          </a:effectRef>
-          <a:fontRef idx="minor">
-            <a:schemeClr val="tx1"/>
-          </a:fontRef>
-        </p:style>
-      </p:cxnSp>
-      <mc:AlternateContent xmlns:mc="http://schemas.openxmlformats.org/markup-compatibility/2006" xmlns:a14="http://schemas.microsoft.com/office/drawing/2010/main">
-        <mc:Choice Requires="a14">
-          <p:sp>
-            <p:nvSpPr>
-              <p:cNvPr id="33" name="TextBox 32">
-                <a:extLst>
-                  <a:ext uri="{FF2B5EF4-FFF2-40B4-BE49-F238E27FC236}">
-                    <a16:creationId xmlns:a16="http://schemas.microsoft.com/office/drawing/2014/main" id="{1DB29360-B2CF-46A4-890C-6DC282C6AC36}"/>
-                  </a:ext>
-                </a:extLst>
-              </p:cNvPr>
-              <p:cNvSpPr txBox="1"/>
-              <p:nvPr/>
-            </p:nvSpPr>
-            <p:spPr>
-              <a:xfrm>
-                <a:off x="1631234" y="160200"/>
-                <a:ext cx="246465" cy="253274"/>
-              </a:xfrm>
-              <a:prstGeom prst="rect">
-                <a:avLst/>
-              </a:prstGeom>
-              <a:noFill/>
-            </p:spPr>
-            <p:txBody>
-              <a:bodyPr wrap="square" rtlCol="0">
-                <a:spAutoFit/>
-              </a:bodyPr>
-              <a:lstStyle/>
-              <a:p>
-                <a:pPr algn="ctr"/>
-                <a14:m>
-                  <m:oMathPara xmlns:m="http://schemas.openxmlformats.org/officeDocument/2006/math">
-                    <m:oMathParaPr>
-                      <m:jc m:val="centerGroup"/>
-                    </m:oMathParaPr>
-                    <m:oMath xmlns:m="http://schemas.openxmlformats.org/officeDocument/2006/math">
-                      <m:r>
-                        <a:rPr lang="en-US" altLang="ko-KR" sz="1000" b="1" i="1" dirty="0" smtClean="0">
-                          <a:solidFill>
-                            <a:schemeClr val="bg1"/>
-                          </a:solidFill>
-                          <a:latin typeface="Cambria Math" panose="02040503050406030204" pitchFamily="18" charset="0"/>
-                          <a:cs typeface="helvetica" panose="020B0604020202020204" pitchFamily="34" charset="0"/>
-                        </a:rPr>
-                        <m:t>𝟏𝟎𝟎</m:t>
-                      </m:r>
-                      <m:r>
-                        <a:rPr lang="en-US" altLang="ko-KR" sz="1000" b="1" i="1" dirty="0" smtClean="0">
-                          <a:solidFill>
-                            <a:schemeClr val="bg1"/>
-                          </a:solidFill>
-                          <a:latin typeface="Cambria Math" panose="02040503050406030204" pitchFamily="18" charset="0"/>
-                          <a:cs typeface="helvetica" panose="020B0604020202020204" pitchFamily="34" charset="0"/>
-                        </a:rPr>
-                        <m:t>°</m:t>
-                      </m:r>
-                    </m:oMath>
-                  </m:oMathPara>
-                </a14:m>
-                <a:endParaRPr lang="ko-KR" altLang="en-US" sz="1000" b="1" dirty="0">
+        </p:nvGrpSpPr>
+        <p:grpSpPr>
+          <a:xfrm>
+            <a:off x="-58568" y="-43075"/>
+            <a:ext cx="3478043" cy="3283163"/>
+            <a:chOff x="122407" y="-43075"/>
+            <a:chExt cx="3478043" cy="3283163"/>
+          </a:xfrm>
+        </p:grpSpPr>
+        <p:pic>
+          <p:nvPicPr>
+            <p:cNvPr id="8" name="그림 7">
+              <a:extLst>
+                <a:ext uri="{FF2B5EF4-FFF2-40B4-BE49-F238E27FC236}">
+                  <a16:creationId xmlns:a16="http://schemas.microsoft.com/office/drawing/2014/main" id="{72DE56F5-5193-4D83-94C4-8837A2B8F5D6}"/>
+                </a:ext>
+              </a:extLst>
+            </p:cNvPr>
+            <p:cNvPicPr>
+              <a:picLocks/>
+            </p:cNvPicPr>
+            <p:nvPr/>
+          </p:nvPicPr>
+          <p:blipFill>
+            <a:blip r:embed="rId3">
+              <a:extLst>
+                <a:ext uri="{28A0092B-C50C-407E-A947-70E740481C1C}">
+                  <a14:useLocalDpi xmlns:a14="http://schemas.microsoft.com/office/drawing/2010/main" val="0"/>
+                </a:ext>
+              </a:extLst>
+            </a:blip>
+            <a:stretch>
+              <a:fillRect/>
+            </a:stretch>
+          </p:blipFill>
+          <p:spPr>
+            <a:xfrm>
+              <a:off x="359545" y="1620088"/>
+              <a:ext cx="1620000" cy="1620000"/>
+            </a:xfrm>
+            <a:prstGeom prst="rect">
+              <a:avLst/>
+            </a:prstGeom>
+            <a:ln>
+              <a:solidFill>
+                <a:schemeClr val="tx1"/>
+              </a:solidFill>
+            </a:ln>
+          </p:spPr>
+        </p:pic>
+        <p:pic>
+          <p:nvPicPr>
+            <p:cNvPr id="10" name="그림 9">
+              <a:extLst>
+                <a:ext uri="{FF2B5EF4-FFF2-40B4-BE49-F238E27FC236}">
+                  <a16:creationId xmlns:a16="http://schemas.microsoft.com/office/drawing/2014/main" id="{E06D5577-C201-490E-BFB7-89F6B4C571B7}"/>
+                </a:ext>
+              </a:extLst>
+            </p:cNvPr>
+            <p:cNvPicPr>
+              <a:picLocks/>
+            </p:cNvPicPr>
+            <p:nvPr/>
+          </p:nvPicPr>
+          <p:blipFill>
+            <a:blip r:embed="rId4">
+              <a:extLst>
+                <a:ext uri="{28A0092B-C50C-407E-A947-70E740481C1C}">
+                  <a14:useLocalDpi xmlns:a14="http://schemas.microsoft.com/office/drawing/2010/main" val="0"/>
+                </a:ext>
+              </a:extLst>
+            </a:blip>
+            <a:stretch>
+              <a:fillRect/>
+            </a:stretch>
+          </p:blipFill>
+          <p:spPr>
+            <a:xfrm>
+              <a:off x="1980450" y="1620088"/>
+              <a:ext cx="1620000" cy="1620000"/>
+            </a:xfrm>
+            <a:prstGeom prst="rect">
+              <a:avLst/>
+            </a:prstGeom>
+            <a:ln>
+              <a:solidFill>
+                <a:schemeClr val="tx1"/>
+              </a:solidFill>
+            </a:ln>
+          </p:spPr>
+        </p:pic>
+        <p:pic>
+          <p:nvPicPr>
+            <p:cNvPr id="12" name="그림 11">
+              <a:extLst>
+                <a:ext uri="{FF2B5EF4-FFF2-40B4-BE49-F238E27FC236}">
+                  <a16:creationId xmlns:a16="http://schemas.microsoft.com/office/drawing/2014/main" id="{5E7EDF87-0293-48F4-9ACB-81DD0B6B623C}"/>
+                </a:ext>
+              </a:extLst>
+            </p:cNvPr>
+            <p:cNvPicPr>
+              <a:picLocks/>
+            </p:cNvPicPr>
+            <p:nvPr/>
+          </p:nvPicPr>
+          <p:blipFill>
+            <a:blip r:embed="rId5">
+              <a:extLst>
+                <a:ext uri="{28A0092B-C50C-407E-A947-70E740481C1C}">
+                  <a14:useLocalDpi xmlns:a14="http://schemas.microsoft.com/office/drawing/2010/main" val="0"/>
+                </a:ext>
+              </a:extLst>
+            </a:blip>
+            <a:stretch>
+              <a:fillRect/>
+            </a:stretch>
+          </p:blipFill>
+          <p:spPr>
+            <a:xfrm>
+              <a:off x="1980450" y="0"/>
+              <a:ext cx="1620000" cy="1620000"/>
+            </a:xfrm>
+            <a:prstGeom prst="rect">
+              <a:avLst/>
+            </a:prstGeom>
+            <a:ln>
+              <a:solidFill>
+                <a:schemeClr val="tx1"/>
+              </a:solidFill>
+            </a:ln>
+          </p:spPr>
+        </p:pic>
+        <p:pic>
+          <p:nvPicPr>
+            <p:cNvPr id="14" name="그림 13">
+              <a:extLst>
+                <a:ext uri="{FF2B5EF4-FFF2-40B4-BE49-F238E27FC236}">
+                  <a16:creationId xmlns:a16="http://schemas.microsoft.com/office/drawing/2014/main" id="{3F49710F-A9F8-47EF-9C38-0307CE041284}"/>
+                </a:ext>
+              </a:extLst>
+            </p:cNvPr>
+            <p:cNvPicPr>
+              <a:picLocks/>
+            </p:cNvPicPr>
+            <p:nvPr/>
+          </p:nvPicPr>
+          <p:blipFill>
+            <a:blip r:embed="rId6">
+              <a:extLst>
+                <a:ext uri="{28A0092B-C50C-407E-A947-70E740481C1C}">
+                  <a14:useLocalDpi xmlns:a14="http://schemas.microsoft.com/office/drawing/2010/main" val="0"/>
+                </a:ext>
+              </a:extLst>
+            </a:blip>
+            <a:stretch>
+              <a:fillRect/>
+            </a:stretch>
+          </p:blipFill>
+          <p:spPr>
+            <a:xfrm>
+              <a:off x="359545" y="0"/>
+              <a:ext cx="1620000" cy="1620000"/>
+            </a:xfrm>
+            <a:prstGeom prst="rect">
+              <a:avLst/>
+            </a:prstGeom>
+            <a:ln>
+              <a:solidFill>
+                <a:schemeClr val="tx1"/>
+              </a:solidFill>
+            </a:ln>
+          </p:spPr>
+        </p:pic>
+        <p:cxnSp>
+          <p:nvCxnSpPr>
+            <p:cNvPr id="32" name="직선 화살표 연결선 31">
+              <a:extLst>
+                <a:ext uri="{FF2B5EF4-FFF2-40B4-BE49-F238E27FC236}">
+                  <a16:creationId xmlns:a16="http://schemas.microsoft.com/office/drawing/2014/main" id="{6AA4DDAD-7718-4CD2-89BE-070969DE556F}"/>
+                </a:ext>
+              </a:extLst>
+            </p:cNvPr>
+            <p:cNvCxnSpPr>
+              <a:cxnSpLocks/>
+            </p:cNvCxnSpPr>
+            <p:nvPr/>
+          </p:nvCxnSpPr>
+          <p:spPr>
+            <a:xfrm flipV="1">
+              <a:off x="366587" y="0"/>
+              <a:ext cx="1608757" cy="1613647"/>
+            </a:xfrm>
+            <a:prstGeom prst="straightConnector1">
+              <a:avLst/>
+            </a:prstGeom>
+            <a:ln>
+              <a:solidFill>
+                <a:schemeClr val="bg1"/>
+              </a:solidFill>
+              <a:headEnd type="stealth"/>
+              <a:tailEnd type="stealth"/>
+            </a:ln>
+          </p:spPr>
+          <p:style>
+            <a:lnRef idx="1">
+              <a:schemeClr val="accent1"/>
+            </a:lnRef>
+            <a:fillRef idx="0">
+              <a:schemeClr val="accent1"/>
+            </a:fillRef>
+            <a:effectRef idx="0">
+              <a:schemeClr val="accent1"/>
+            </a:effectRef>
+            <a:fontRef idx="minor">
+              <a:schemeClr val="tx1"/>
+            </a:fontRef>
+          </p:style>
+        </p:cxnSp>
+        <mc:AlternateContent xmlns:mc="http://schemas.openxmlformats.org/markup-compatibility/2006">
+          <mc:Choice xmlns:a14="http://schemas.microsoft.com/office/drawing/2010/main" Requires="a14">
+            <p:sp>
+              <p:nvSpPr>
+                <p:cNvPr id="33" name="TextBox 32">
+                  <a:extLst>
+                    <a:ext uri="{FF2B5EF4-FFF2-40B4-BE49-F238E27FC236}">
+                      <a16:creationId xmlns:a16="http://schemas.microsoft.com/office/drawing/2014/main" id="{1DB29360-B2CF-46A4-890C-6DC282C6AC36}"/>
+                    </a:ext>
+                  </a:extLst>
+                </p:cNvPr>
+                <p:cNvSpPr txBox="1"/>
+                <p:nvPr/>
+              </p:nvSpPr>
+              <p:spPr>
+                <a:xfrm>
+                  <a:off x="618886" y="1319092"/>
+                  <a:ext cx="246465" cy="253274"/>
+                </a:xfrm>
+                <a:prstGeom prst="rect">
+                  <a:avLst/>
+                </a:prstGeom>
+                <a:noFill/>
+              </p:spPr>
+              <p:txBody>
+                <a:bodyPr wrap="square" rtlCol="0">
+                  <a:spAutoFit/>
+                </a:bodyPr>
+                <a:lstStyle/>
+                <a:p>
+                  <a:pPr algn="ctr"/>
+                  <a14:m>
+                    <m:oMathPara xmlns:m="http://schemas.openxmlformats.org/officeDocument/2006/math">
+                      <m:oMathParaPr>
+                        <m:jc m:val="centerGroup"/>
+                      </m:oMathParaPr>
+                      <m:oMath xmlns:m="http://schemas.openxmlformats.org/officeDocument/2006/math">
+                        <m:r>
+                          <a:rPr lang="en-US" altLang="ko-KR" sz="1000" b="1" i="1" dirty="0">
+                            <a:solidFill>
+                              <a:schemeClr val="bg1"/>
+                            </a:solidFill>
+                            <a:latin typeface="Cambria Math" panose="02040503050406030204" pitchFamily="18" charset="0"/>
+                            <a:cs typeface="helvetica" panose="020B0604020202020204" pitchFamily="34" charset="0"/>
+                          </a:rPr>
+                          <m:t>𝟏𝟎𝟎</m:t>
+                        </m:r>
+                        <m:r>
+                          <a:rPr lang="en-US" altLang="ko-KR" sz="1000" b="1" i="1" dirty="0">
+                            <a:solidFill>
+                              <a:schemeClr val="bg1"/>
+                            </a:solidFill>
+                            <a:latin typeface="Cambria Math" panose="02040503050406030204" pitchFamily="18" charset="0"/>
+                            <a:cs typeface="helvetica" panose="020B0604020202020204" pitchFamily="34" charset="0"/>
+                          </a:rPr>
+                          <m:t>°</m:t>
+                        </m:r>
+                      </m:oMath>
+                    </m:oMathPara>
+                  </a14:m>
+                  <a:endParaRPr lang="ko-KR" altLang="en-US" sz="1000" b="1" dirty="0">
+                    <a:solidFill>
+                      <a:schemeClr val="bg1"/>
+                    </a:solidFill>
+                    <a:latin typeface="helvetica" panose="020B0604020202020204" pitchFamily="34" charset="0"/>
+                    <a:cs typeface="helvetica" panose="020B0604020202020204" pitchFamily="34" charset="0"/>
+                  </a:endParaRPr>
+                </a:p>
+              </p:txBody>
+            </p:sp>
+          </mc:Choice>
+          <mc:Fallback>
+            <p:sp>
+              <p:nvSpPr>
+                <p:cNvPr id="33" name="TextBox 32">
+                  <a:extLst>
+                    <a:ext uri="{FF2B5EF4-FFF2-40B4-BE49-F238E27FC236}">
+                      <a16:creationId xmlns:a16="http://schemas.microsoft.com/office/drawing/2014/main" id="{1DB29360-B2CF-46A4-890C-6DC282C6AC36}"/>
+                    </a:ext>
+                  </a:extLst>
+                </p:cNvPr>
+                <p:cNvSpPr txBox="1">
+                  <a:spLocks noRot="1" noChangeAspect="1" noMove="1" noResize="1" noEditPoints="1" noAdjustHandles="1" noChangeArrowheads="1" noChangeShapeType="1" noTextEdit="1"/>
+                </p:cNvSpPr>
+                <p:nvPr/>
+              </p:nvSpPr>
+              <p:spPr>
+                <a:xfrm>
+                  <a:off x="618886" y="1319092"/>
+                  <a:ext cx="246465" cy="253274"/>
+                </a:xfrm>
+                <a:prstGeom prst="rect">
+                  <a:avLst/>
+                </a:prstGeom>
+                <a:blipFill>
+                  <a:blip r:embed="rId7"/>
+                  <a:stretch>
+                    <a:fillRect l="-32500" r="-20000"/>
+                  </a:stretch>
+                </a:blipFill>
+              </p:spPr>
+              <p:txBody>
+                <a:bodyPr/>
+                <a:lstStyle/>
+                <a:p>
+                  <a:r>
+                    <a:rPr lang="ko-KR" altLang="en-US">
+                      <a:noFill/>
+                    </a:rPr>
+                    <a:t> </a:t>
+                  </a:r>
+                </a:p>
+              </p:txBody>
+            </p:sp>
+          </mc:Fallback>
+        </mc:AlternateContent>
+        <p:sp>
+          <p:nvSpPr>
+            <p:cNvPr id="4" name="TextBox 3">
+              <a:extLst>
+                <a:ext uri="{FF2B5EF4-FFF2-40B4-BE49-F238E27FC236}">
+                  <a16:creationId xmlns:a16="http://schemas.microsoft.com/office/drawing/2014/main" id="{9D20D69F-357C-4908-A803-397CD34418DA}"/>
+                </a:ext>
+              </a:extLst>
+            </p:cNvPr>
+            <p:cNvSpPr txBox="1"/>
+            <p:nvPr/>
+          </p:nvSpPr>
+          <p:spPr>
+            <a:xfrm>
+              <a:off x="598722" y="-43075"/>
+              <a:ext cx="1141647" cy="261610"/>
+            </a:xfrm>
+            <a:prstGeom prst="rect">
+              <a:avLst/>
+            </a:prstGeom>
+            <a:noFill/>
+          </p:spPr>
+          <p:txBody>
+            <a:bodyPr wrap="square" rtlCol="0">
+              <a:spAutoFit/>
+            </a:bodyPr>
+            <a:lstStyle/>
+            <a:p>
+              <a:pPr algn="ctr"/>
+              <a:r>
+                <a:rPr lang="en-US" altLang="ko-KR" sz="1100" b="1" dirty="0">
                   <a:solidFill>
                     <a:schemeClr val="bg1"/>
                   </a:solidFill>
                   <a:latin typeface="helvetica" panose="020B0604020202020204" pitchFamily="34" charset="0"/>
                   <a:cs typeface="helvetica" panose="020B0604020202020204" pitchFamily="34" charset="0"/>
-                </a:endParaRPr>
-              </a:p>
-            </p:txBody>
-          </p:sp>
-        </mc:Choice>
-        <mc:Fallback xmlns="">
-          <p:sp>
-            <p:nvSpPr>
-              <p:cNvPr id="33" name="TextBox 32">
-                <a:extLst>
-                  <a:ext uri="{FF2B5EF4-FFF2-40B4-BE49-F238E27FC236}">
-                    <a16:creationId xmlns:a16="http://schemas.microsoft.com/office/drawing/2014/main" id="{1DB29360-B2CF-46A4-890C-6DC282C6AC36}"/>
-                  </a:ext>
-                </a:extLst>
-              </p:cNvPr>
-              <p:cNvSpPr txBox="1">
-                <a:spLocks noRot="1" noChangeAspect="1" noMove="1" noResize="1" noEditPoints="1" noAdjustHandles="1" noChangeArrowheads="1" noChangeShapeType="1" noTextEdit="1"/>
-              </p:cNvSpPr>
-              <p:nvPr/>
-            </p:nvSpPr>
-            <p:spPr>
-              <a:xfrm>
-                <a:off x="1631234" y="160200"/>
-                <a:ext cx="246465" cy="253274"/>
-              </a:xfrm>
-              <a:prstGeom prst="rect">
-                <a:avLst/>
-              </a:prstGeom>
-              <a:blipFill>
-                <a:blip r:embed="rId7"/>
-                <a:stretch>
-                  <a:fillRect l="-32500" r="-20000"/>
-                </a:stretch>
-              </a:blipFill>
-            </p:spPr>
-            <p:txBody>
-              <a:bodyPr/>
-              <a:lstStyle/>
-              <a:p>
-                <a:r>
-                  <a:rPr lang="ko-KR" altLang="en-US">
-                    <a:noFill/>
-                  </a:rPr>
-                  <a:t> </a:t>
-                </a:r>
-              </a:p>
-            </p:txBody>
-          </p:sp>
-        </mc:Fallback>
-      </mc:AlternateContent>
+                </a:rPr>
+                <a:t>Raw</a:t>
+              </a:r>
+              <a:endParaRPr lang="ko-KR" altLang="en-US" sz="1100" b="1" dirty="0">
+                <a:solidFill>
+                  <a:schemeClr val="bg1"/>
+                </a:solidFill>
+                <a:latin typeface="helvetica" panose="020B0604020202020204" pitchFamily="34" charset="0"/>
+                <a:cs typeface="helvetica" panose="020B0604020202020204" pitchFamily="34" charset="0"/>
+              </a:endParaRPr>
+            </a:p>
+          </p:txBody>
+        </p:sp>
+        <p:sp>
+          <p:nvSpPr>
+            <p:cNvPr id="5" name="TextBox 4">
+              <a:extLst>
+                <a:ext uri="{FF2B5EF4-FFF2-40B4-BE49-F238E27FC236}">
+                  <a16:creationId xmlns:a16="http://schemas.microsoft.com/office/drawing/2014/main" id="{C89DE598-7CAB-4474-AAE1-818256996A53}"/>
+                </a:ext>
+              </a:extLst>
+            </p:cNvPr>
+            <p:cNvSpPr txBox="1"/>
+            <p:nvPr/>
+          </p:nvSpPr>
+          <p:spPr>
+            <a:xfrm>
+              <a:off x="2170448" y="-43075"/>
+              <a:ext cx="1240004" cy="261610"/>
+            </a:xfrm>
+            <a:prstGeom prst="rect">
+              <a:avLst/>
+            </a:prstGeom>
+            <a:noFill/>
+          </p:spPr>
+          <p:txBody>
+            <a:bodyPr wrap="square" rtlCol="0">
+              <a:spAutoFit/>
+            </a:bodyPr>
+            <a:lstStyle/>
+            <a:p>
+              <a:pPr algn="ctr"/>
+              <a:r>
+                <a:rPr lang="en-US" altLang="ko-KR" sz="1100" b="1" dirty="0">
+                  <a:solidFill>
+                    <a:schemeClr val="bg1"/>
+                  </a:solidFill>
+                  <a:latin typeface="helvetica" panose="020B0604020202020204" pitchFamily="34" charset="0"/>
+                  <a:cs typeface="helvetica" panose="020B0604020202020204" pitchFamily="34" charset="0"/>
+                </a:rPr>
+                <a:t>Reconstructed</a:t>
+              </a:r>
+              <a:endParaRPr lang="ko-KR" altLang="en-US" sz="1100" b="1" dirty="0">
+                <a:solidFill>
+                  <a:schemeClr val="bg1"/>
+                </a:solidFill>
+                <a:latin typeface="helvetica" panose="020B0604020202020204" pitchFamily="34" charset="0"/>
+                <a:cs typeface="helvetica" panose="020B0604020202020204" pitchFamily="34" charset="0"/>
+              </a:endParaRPr>
+            </a:p>
+          </p:txBody>
+        </p:sp>
+        <p:sp>
+          <p:nvSpPr>
+            <p:cNvPr id="6" name="TextBox 5">
+              <a:extLst>
+                <a:ext uri="{FF2B5EF4-FFF2-40B4-BE49-F238E27FC236}">
+                  <a16:creationId xmlns:a16="http://schemas.microsoft.com/office/drawing/2014/main" id="{0E14188E-BA84-4CF2-A5C2-7BDE212F8ECD}"/>
+                </a:ext>
+              </a:extLst>
+            </p:cNvPr>
+            <p:cNvSpPr txBox="1"/>
+            <p:nvPr/>
+          </p:nvSpPr>
+          <p:spPr>
+            <a:xfrm rot="16200000">
+              <a:off x="-82280" y="679195"/>
+              <a:ext cx="670983" cy="261610"/>
+            </a:xfrm>
+            <a:prstGeom prst="rect">
+              <a:avLst/>
+            </a:prstGeom>
+            <a:noFill/>
+          </p:spPr>
+          <p:txBody>
+            <a:bodyPr wrap="square" rtlCol="0">
+              <a:spAutoFit/>
+            </a:bodyPr>
+            <a:lstStyle/>
+            <a:p>
+              <a:pPr algn="ctr"/>
+              <a:r>
+                <a:rPr lang="en-US" altLang="ko-KR" sz="1100" b="1" dirty="0">
+                  <a:latin typeface="helvetica" panose="020B0604020202020204" pitchFamily="34" charset="0"/>
+                  <a:cs typeface="helvetica" panose="020B0604020202020204" pitchFamily="34" charset="0"/>
+                </a:rPr>
+                <a:t>Singlet</a:t>
+              </a:r>
+              <a:endParaRPr lang="ko-KR" altLang="en-US" sz="1100" b="1" dirty="0">
+                <a:latin typeface="helvetica" panose="020B0604020202020204" pitchFamily="34" charset="0"/>
+                <a:cs typeface="helvetica" panose="020B0604020202020204" pitchFamily="34" charset="0"/>
+              </a:endParaRPr>
+            </a:p>
+          </p:txBody>
+        </p:sp>
+        <p:sp>
+          <p:nvSpPr>
+            <p:cNvPr id="7" name="TextBox 6">
+              <a:extLst>
+                <a:ext uri="{FF2B5EF4-FFF2-40B4-BE49-F238E27FC236}">
+                  <a16:creationId xmlns:a16="http://schemas.microsoft.com/office/drawing/2014/main" id="{0FF46201-A366-4A3C-BE03-4A96D4A4D989}"/>
+                </a:ext>
+              </a:extLst>
+            </p:cNvPr>
+            <p:cNvSpPr txBox="1"/>
+            <p:nvPr/>
+          </p:nvSpPr>
+          <p:spPr>
+            <a:xfrm rot="16200000">
+              <a:off x="-72501" y="2317283"/>
+              <a:ext cx="670983" cy="261610"/>
+            </a:xfrm>
+            <a:prstGeom prst="rect">
+              <a:avLst/>
+            </a:prstGeom>
+            <a:noFill/>
+          </p:spPr>
+          <p:txBody>
+            <a:bodyPr wrap="square" rtlCol="0">
+              <a:spAutoFit/>
+            </a:bodyPr>
+            <a:lstStyle/>
+            <a:p>
+              <a:pPr algn="ctr"/>
+              <a:r>
+                <a:rPr lang="en-US" altLang="ko-KR" sz="1100" b="1" dirty="0">
+                  <a:latin typeface="helvetica" panose="020B0604020202020204" pitchFamily="34" charset="0"/>
+                  <a:cs typeface="helvetica" panose="020B0604020202020204" pitchFamily="34" charset="0"/>
+                </a:rPr>
+                <a:t>Ours</a:t>
+              </a:r>
+              <a:endParaRPr lang="ko-KR" altLang="en-US" sz="1100" b="1" dirty="0">
+                <a:latin typeface="helvetica" panose="020B0604020202020204" pitchFamily="34" charset="0"/>
+                <a:cs typeface="helvetica" panose="020B0604020202020204" pitchFamily="34" charset="0"/>
+              </a:endParaRPr>
+            </a:p>
+          </p:txBody>
+        </p:sp>
+      </p:grpSp>
     </p:spTree>
   </p:cSld>
   <p:clrMapOvr>

</xml_diff>

<commit_message>
Deploying to gh-pages from @ YoungJIn94/YoungJIn94.github.io@ffea339ef7e7f8de0dc8f9f6673481922edbf890 🚀
</commit_message>
<xml_diff>
--- a/assets/img/publication_preview/E2ECamera.pptx
+++ b/assets/img/publication_preview/E2ECamera.pptx
@@ -10,14 +10,14 @@
   <p:sldIdLst>
     <p:sldId id="256" r:id="rId2"/>
   </p:sldIdLst>
-  <p:sldSz cx="3419475" cy="3240088"/>
+  <p:sldSz cx="3600450" cy="3035300"/>
   <p:notesSz cx="7772400" cy="10058400"/>
   <p:defaultTextStyle>
     <a:defPPr>
       <a:defRPr lang="ko-KR"/>
     </a:defPPr>
-    <a:lvl1pPr marL="0" algn="l" defTabSz="531603" rtl="0" eaLnBrk="1" latinLnBrk="1" hangingPunct="1">
-      <a:defRPr sz="1046" kern="1200">
+    <a:lvl1pPr marL="0" algn="l" defTabSz="574769" rtl="0" eaLnBrk="1" latinLnBrk="1" hangingPunct="1">
+      <a:defRPr sz="1131" kern="1200">
         <a:solidFill>
           <a:schemeClr val="tx1"/>
         </a:solidFill>
@@ -26,8 +26,8 @@
         <a:cs typeface="+mn-cs"/>
       </a:defRPr>
     </a:lvl1pPr>
-    <a:lvl2pPr marL="265801" algn="l" defTabSz="531603" rtl="0" eaLnBrk="1" latinLnBrk="1" hangingPunct="1">
-      <a:defRPr sz="1046" kern="1200">
+    <a:lvl2pPr marL="287384" algn="l" defTabSz="574769" rtl="0" eaLnBrk="1" latinLnBrk="1" hangingPunct="1">
+      <a:defRPr sz="1131" kern="1200">
         <a:solidFill>
           <a:schemeClr val="tx1"/>
         </a:solidFill>
@@ -36,8 +36,8 @@
         <a:cs typeface="+mn-cs"/>
       </a:defRPr>
     </a:lvl2pPr>
-    <a:lvl3pPr marL="531603" algn="l" defTabSz="531603" rtl="0" eaLnBrk="1" latinLnBrk="1" hangingPunct="1">
-      <a:defRPr sz="1046" kern="1200">
+    <a:lvl3pPr marL="574769" algn="l" defTabSz="574769" rtl="0" eaLnBrk="1" latinLnBrk="1" hangingPunct="1">
+      <a:defRPr sz="1131" kern="1200">
         <a:solidFill>
           <a:schemeClr val="tx1"/>
         </a:solidFill>
@@ -46,8 +46,8 @@
         <a:cs typeface="+mn-cs"/>
       </a:defRPr>
     </a:lvl3pPr>
-    <a:lvl4pPr marL="797403" algn="l" defTabSz="531603" rtl="0" eaLnBrk="1" latinLnBrk="1" hangingPunct="1">
-      <a:defRPr sz="1046" kern="1200">
+    <a:lvl4pPr marL="862152" algn="l" defTabSz="574769" rtl="0" eaLnBrk="1" latinLnBrk="1" hangingPunct="1">
+      <a:defRPr sz="1131" kern="1200">
         <a:solidFill>
           <a:schemeClr val="tx1"/>
         </a:solidFill>
@@ -56,8 +56,8 @@
         <a:cs typeface="+mn-cs"/>
       </a:defRPr>
     </a:lvl4pPr>
-    <a:lvl5pPr marL="1063204" algn="l" defTabSz="531603" rtl="0" eaLnBrk="1" latinLnBrk="1" hangingPunct="1">
-      <a:defRPr sz="1046" kern="1200">
+    <a:lvl5pPr marL="1149536" algn="l" defTabSz="574769" rtl="0" eaLnBrk="1" latinLnBrk="1" hangingPunct="1">
+      <a:defRPr sz="1131" kern="1200">
         <a:solidFill>
           <a:schemeClr val="tx1"/>
         </a:solidFill>
@@ -66,8 +66,8 @@
         <a:cs typeface="+mn-cs"/>
       </a:defRPr>
     </a:lvl5pPr>
-    <a:lvl6pPr marL="1329005" algn="l" defTabSz="531603" rtl="0" eaLnBrk="1" latinLnBrk="1" hangingPunct="1">
-      <a:defRPr sz="1046" kern="1200">
+    <a:lvl6pPr marL="1436920" algn="l" defTabSz="574769" rtl="0" eaLnBrk="1" latinLnBrk="1" hangingPunct="1">
+      <a:defRPr sz="1131" kern="1200">
         <a:solidFill>
           <a:schemeClr val="tx1"/>
         </a:solidFill>
@@ -76,8 +76,8 @@
         <a:cs typeface="+mn-cs"/>
       </a:defRPr>
     </a:lvl6pPr>
-    <a:lvl7pPr marL="1594807" algn="l" defTabSz="531603" rtl="0" eaLnBrk="1" latinLnBrk="1" hangingPunct="1">
-      <a:defRPr sz="1046" kern="1200">
+    <a:lvl7pPr marL="1724305" algn="l" defTabSz="574769" rtl="0" eaLnBrk="1" latinLnBrk="1" hangingPunct="1">
+      <a:defRPr sz="1131" kern="1200">
         <a:solidFill>
           <a:schemeClr val="tx1"/>
         </a:solidFill>
@@ -86,8 +86,8 @@
         <a:cs typeface="+mn-cs"/>
       </a:defRPr>
     </a:lvl7pPr>
-    <a:lvl8pPr marL="1860607" algn="l" defTabSz="531603" rtl="0" eaLnBrk="1" latinLnBrk="1" hangingPunct="1">
-      <a:defRPr sz="1046" kern="1200">
+    <a:lvl8pPr marL="2011688" algn="l" defTabSz="574769" rtl="0" eaLnBrk="1" latinLnBrk="1" hangingPunct="1">
+      <a:defRPr sz="1131" kern="1200">
         <a:solidFill>
           <a:schemeClr val="tx1"/>
         </a:solidFill>
@@ -96,8 +96,8 @@
         <a:cs typeface="+mn-cs"/>
       </a:defRPr>
     </a:lvl8pPr>
-    <a:lvl9pPr marL="2126408" algn="l" defTabSz="531603" rtl="0" eaLnBrk="1" latinLnBrk="1" hangingPunct="1">
-      <a:defRPr sz="1046" kern="1200">
+    <a:lvl9pPr marL="2299072" algn="l" defTabSz="574769" rtl="0" eaLnBrk="1" latinLnBrk="1" hangingPunct="1">
+      <a:defRPr sz="1131" kern="1200">
         <a:solidFill>
           <a:schemeClr val="tx1"/>
         </a:solidFill>
@@ -197,7 +197,7 @@
           <a:p>
             <a:fld id="{0903332B-846A-4D2B-8B67-F9309C5158BD}" type="datetimeFigureOut">
               <a:rPr lang="ko-KR" altLang="en-US" smtClean="0"/>
-              <a:t>2025-02-20</a:t>
+              <a:t>2025-02-22</a:t>
             </a:fld>
             <a:endParaRPr lang="ko-KR" altLang="en-US"/>
           </a:p>
@@ -215,8 +215,8 @@
         </p:nvSpPr>
         <p:spPr>
           <a:xfrm>
-            <a:off x="2095500" y="1257300"/>
-            <a:ext cx="3581400" cy="3394075"/>
+            <a:off x="1873250" y="1257300"/>
+            <a:ext cx="4025900" cy="3394075"/>
           </a:xfrm>
           <a:prstGeom prst="rect">
             <a:avLst/>
@@ -370,8 +370,8 @@
   </p:cSld>
   <p:clrMap bg1="lt1" tx1="dk1" bg2="lt2" tx2="dk2" accent1="accent1" accent2="accent2" accent3="accent3" accent4="accent4" accent5="accent5" accent6="accent6" hlink="hlink" folHlink="folHlink"/>
   <p:notesStyle>
-    <a:lvl1pPr marL="0" algn="l" defTabSz="787676" rtl="0" eaLnBrk="1" latinLnBrk="1" hangingPunct="1">
-      <a:defRPr sz="1033" kern="1200">
+    <a:lvl1pPr marL="0" algn="l" defTabSz="851635" rtl="0" eaLnBrk="1" latinLnBrk="1" hangingPunct="1">
+      <a:defRPr sz="1117" kern="1200">
         <a:solidFill>
           <a:schemeClr val="tx1"/>
         </a:solidFill>
@@ -380,8 +380,8 @@
         <a:cs typeface="+mn-cs"/>
       </a:defRPr>
     </a:lvl1pPr>
-    <a:lvl2pPr marL="393838" algn="l" defTabSz="787676" rtl="0" eaLnBrk="1" latinLnBrk="1" hangingPunct="1">
-      <a:defRPr sz="1033" kern="1200">
+    <a:lvl2pPr marL="425818" algn="l" defTabSz="851635" rtl="0" eaLnBrk="1" latinLnBrk="1" hangingPunct="1">
+      <a:defRPr sz="1117" kern="1200">
         <a:solidFill>
           <a:schemeClr val="tx1"/>
         </a:solidFill>
@@ -390,8 +390,8 @@
         <a:cs typeface="+mn-cs"/>
       </a:defRPr>
     </a:lvl2pPr>
-    <a:lvl3pPr marL="787676" algn="l" defTabSz="787676" rtl="0" eaLnBrk="1" latinLnBrk="1" hangingPunct="1">
-      <a:defRPr sz="1033" kern="1200">
+    <a:lvl3pPr marL="851635" algn="l" defTabSz="851635" rtl="0" eaLnBrk="1" latinLnBrk="1" hangingPunct="1">
+      <a:defRPr sz="1117" kern="1200">
         <a:solidFill>
           <a:schemeClr val="tx1"/>
         </a:solidFill>
@@ -400,8 +400,8 @@
         <a:cs typeface="+mn-cs"/>
       </a:defRPr>
     </a:lvl3pPr>
-    <a:lvl4pPr marL="1181514" algn="l" defTabSz="787676" rtl="0" eaLnBrk="1" latinLnBrk="1" hangingPunct="1">
-      <a:defRPr sz="1033" kern="1200">
+    <a:lvl4pPr marL="1277453" algn="l" defTabSz="851635" rtl="0" eaLnBrk="1" latinLnBrk="1" hangingPunct="1">
+      <a:defRPr sz="1117" kern="1200">
         <a:solidFill>
           <a:schemeClr val="tx1"/>
         </a:solidFill>
@@ -410,8 +410,8 @@
         <a:cs typeface="+mn-cs"/>
       </a:defRPr>
     </a:lvl4pPr>
-    <a:lvl5pPr marL="1575352" algn="l" defTabSz="787676" rtl="0" eaLnBrk="1" latinLnBrk="1" hangingPunct="1">
-      <a:defRPr sz="1033" kern="1200">
+    <a:lvl5pPr marL="1703271" algn="l" defTabSz="851635" rtl="0" eaLnBrk="1" latinLnBrk="1" hangingPunct="1">
+      <a:defRPr sz="1117" kern="1200">
         <a:solidFill>
           <a:schemeClr val="tx1"/>
         </a:solidFill>
@@ -420,8 +420,8 @@
         <a:cs typeface="+mn-cs"/>
       </a:defRPr>
     </a:lvl5pPr>
-    <a:lvl6pPr marL="1969188" algn="l" defTabSz="787676" rtl="0" eaLnBrk="1" latinLnBrk="1" hangingPunct="1">
-      <a:defRPr sz="1033" kern="1200">
+    <a:lvl6pPr marL="2129086" algn="l" defTabSz="851635" rtl="0" eaLnBrk="1" latinLnBrk="1" hangingPunct="1">
+      <a:defRPr sz="1117" kern="1200">
         <a:solidFill>
           <a:schemeClr val="tx1"/>
         </a:solidFill>
@@ -430,8 +430,8 @@
         <a:cs typeface="+mn-cs"/>
       </a:defRPr>
     </a:lvl6pPr>
-    <a:lvl7pPr marL="2363026" algn="l" defTabSz="787676" rtl="0" eaLnBrk="1" latinLnBrk="1" hangingPunct="1">
-      <a:defRPr sz="1033" kern="1200">
+    <a:lvl7pPr marL="2554904" algn="l" defTabSz="851635" rtl="0" eaLnBrk="1" latinLnBrk="1" hangingPunct="1">
+      <a:defRPr sz="1117" kern="1200">
         <a:solidFill>
           <a:schemeClr val="tx1"/>
         </a:solidFill>
@@ -440,8 +440,8 @@
         <a:cs typeface="+mn-cs"/>
       </a:defRPr>
     </a:lvl7pPr>
-    <a:lvl8pPr marL="2756864" algn="l" defTabSz="787676" rtl="0" eaLnBrk="1" latinLnBrk="1" hangingPunct="1">
-      <a:defRPr sz="1033" kern="1200">
+    <a:lvl8pPr marL="2980721" algn="l" defTabSz="851635" rtl="0" eaLnBrk="1" latinLnBrk="1" hangingPunct="1">
+      <a:defRPr sz="1117" kern="1200">
         <a:solidFill>
           <a:schemeClr val="tx1"/>
         </a:solidFill>
@@ -450,8 +450,8 @@
         <a:cs typeface="+mn-cs"/>
       </a:defRPr>
     </a:lvl8pPr>
-    <a:lvl9pPr marL="3150702" algn="l" defTabSz="787676" rtl="0" eaLnBrk="1" latinLnBrk="1" hangingPunct="1">
-      <a:defRPr sz="1033" kern="1200">
+    <a:lvl9pPr marL="3406539" algn="l" defTabSz="851635" rtl="0" eaLnBrk="1" latinLnBrk="1" hangingPunct="1">
+      <a:defRPr sz="1117" kern="1200">
         <a:solidFill>
           <a:schemeClr val="tx1"/>
         </a:solidFill>
@@ -493,8 +493,8 @@
         </p:nvSpPr>
         <p:spPr>
           <a:xfrm>
-            <a:off x="2095500" y="1257300"/>
-            <a:ext cx="3581400" cy="3394075"/>
+            <a:off x="1873250" y="1257300"/>
+            <a:ext cx="4025900" cy="3394075"/>
           </a:xfrm>
         </p:spPr>
       </p:sp>
@@ -607,8 +607,8 @@
         </p:nvSpPr>
         <p:spPr>
           <a:xfrm>
-            <a:off x="170980" y="129264"/>
-            <a:ext cx="3077393" cy="540865"/>
+            <a:off x="180031" y="121094"/>
+            <a:ext cx="3240263" cy="506680"/>
           </a:xfrm>
           <a:prstGeom prst="rect">
             <a:avLst/>
@@ -619,7 +619,7 @@
           <a:lstStyle/>
           <a:p>
             <a:pPr algn="ctr"/>
-            <a:endParaRPr lang="en-US" sz="5060" b="0" strike="noStrike" spc="-1">
+            <a:endParaRPr lang="en-US" sz="5328" b="0" strike="noStrike" spc="-1">
               <a:latin typeface="Arial"/>
             </a:endParaRPr>
           </a:p>
@@ -637,8 +637,8 @@
         </p:nvSpPr>
         <p:spPr>
           <a:xfrm>
-            <a:off x="170980" y="758068"/>
-            <a:ext cx="3077393" cy="896169"/>
+            <a:off x="180031" y="710156"/>
+            <a:ext cx="3240263" cy="839527"/>
           </a:xfrm>
           <a:prstGeom prst="rect">
             <a:avLst/>
@@ -650,7 +650,7 @@
           </a:bodyPr>
           <a:lstStyle/>
           <a:p>
-            <a:endParaRPr lang="en-US" sz="3680" b="0" strike="noStrike" spc="-1">
+            <a:endParaRPr lang="en-US" sz="3875" b="0" strike="noStrike" spc="-1">
               <a:latin typeface="Arial"/>
             </a:endParaRPr>
           </a:p>
@@ -668,8 +668,8 @@
         </p:nvSpPr>
         <p:spPr>
           <a:xfrm>
-            <a:off x="170980" y="1739618"/>
-            <a:ext cx="3077393" cy="896169"/>
+            <a:off x="180031" y="1629667"/>
+            <a:ext cx="3240263" cy="839527"/>
           </a:xfrm>
           <a:prstGeom prst="rect">
             <a:avLst/>
@@ -681,7 +681,7 @@
           </a:bodyPr>
           <a:lstStyle/>
           <a:p>
-            <a:endParaRPr lang="en-US" sz="3680" b="0" strike="noStrike" spc="-1">
+            <a:endParaRPr lang="en-US" sz="3875" b="0" strike="noStrike" spc="-1">
               <a:latin typeface="Arial"/>
             </a:endParaRPr>
           </a:p>
@@ -724,8 +724,8 @@
         </p:nvSpPr>
         <p:spPr>
           <a:xfrm>
-            <a:off x="170980" y="129264"/>
-            <a:ext cx="3077393" cy="540865"/>
+            <a:off x="180031" y="121094"/>
+            <a:ext cx="3240263" cy="506680"/>
           </a:xfrm>
           <a:prstGeom prst="rect">
             <a:avLst/>
@@ -736,7 +736,7 @@
           <a:lstStyle/>
           <a:p>
             <a:pPr algn="ctr"/>
-            <a:endParaRPr lang="en-US" sz="5060" b="0" strike="noStrike" spc="-1">
+            <a:endParaRPr lang="en-US" sz="5328" b="0" strike="noStrike" spc="-1">
               <a:latin typeface="Arial"/>
             </a:endParaRPr>
           </a:p>
@@ -754,8 +754,8 @@
         </p:nvSpPr>
         <p:spPr>
           <a:xfrm>
-            <a:off x="170975" y="758068"/>
-            <a:ext cx="1501742" cy="896169"/>
+            <a:off x="180024" y="710156"/>
+            <a:ext cx="1581221" cy="839527"/>
           </a:xfrm>
           <a:prstGeom prst="rect">
             <a:avLst/>
@@ -767,7 +767,7 @@
           </a:bodyPr>
           <a:lstStyle/>
           <a:p>
-            <a:endParaRPr lang="en-US" sz="3680" b="0" strike="noStrike" spc="-1">
+            <a:endParaRPr lang="en-US" sz="3875" b="0" strike="noStrike" spc="-1">
               <a:latin typeface="Arial"/>
             </a:endParaRPr>
           </a:p>
@@ -785,8 +785,8 @@
         </p:nvSpPr>
         <p:spPr>
           <a:xfrm>
-            <a:off x="1747975" y="758068"/>
-            <a:ext cx="1501742" cy="896169"/>
+            <a:off x="1840487" y="710156"/>
+            <a:ext cx="1581221" cy="839527"/>
           </a:xfrm>
           <a:prstGeom prst="rect">
             <a:avLst/>
@@ -798,7 +798,7 @@
           </a:bodyPr>
           <a:lstStyle/>
           <a:p>
-            <a:endParaRPr lang="en-US" sz="3680" b="0" strike="noStrike" spc="-1">
+            <a:endParaRPr lang="en-US" sz="3875" b="0" strike="noStrike" spc="-1">
               <a:latin typeface="Arial"/>
             </a:endParaRPr>
           </a:p>
@@ -816,8 +816,8 @@
         </p:nvSpPr>
         <p:spPr>
           <a:xfrm>
-            <a:off x="170975" y="1739618"/>
-            <a:ext cx="1501742" cy="896169"/>
+            <a:off x="180024" y="1629667"/>
+            <a:ext cx="1581221" cy="839527"/>
           </a:xfrm>
           <a:prstGeom prst="rect">
             <a:avLst/>
@@ -829,7 +829,7 @@
           </a:bodyPr>
           <a:lstStyle/>
           <a:p>
-            <a:endParaRPr lang="en-US" sz="3680" b="0" strike="noStrike" spc="-1">
+            <a:endParaRPr lang="en-US" sz="3875" b="0" strike="noStrike" spc="-1">
               <a:latin typeface="Arial"/>
             </a:endParaRPr>
           </a:p>
@@ -847,8 +847,8 @@
         </p:nvSpPr>
         <p:spPr>
           <a:xfrm>
-            <a:off x="1747975" y="1739618"/>
-            <a:ext cx="1501742" cy="896169"/>
+            <a:off x="1840487" y="1629667"/>
+            <a:ext cx="1581221" cy="839527"/>
           </a:xfrm>
           <a:prstGeom prst="rect">
             <a:avLst/>
@@ -860,7 +860,7 @@
           </a:bodyPr>
           <a:lstStyle/>
           <a:p>
-            <a:endParaRPr lang="en-US" sz="3680" b="0" strike="noStrike" spc="-1">
+            <a:endParaRPr lang="en-US" sz="3875" b="0" strike="noStrike" spc="-1">
               <a:latin typeface="Arial"/>
             </a:endParaRPr>
           </a:p>
@@ -903,8 +903,8 @@
         </p:nvSpPr>
         <p:spPr>
           <a:xfrm>
-            <a:off x="170980" y="129264"/>
-            <a:ext cx="3077393" cy="540865"/>
+            <a:off x="180031" y="121094"/>
+            <a:ext cx="3240263" cy="506680"/>
           </a:xfrm>
           <a:prstGeom prst="rect">
             <a:avLst/>
@@ -915,7 +915,7 @@
           <a:lstStyle/>
           <a:p>
             <a:pPr algn="ctr"/>
-            <a:endParaRPr lang="en-US" sz="5060" b="0" strike="noStrike" spc="-1">
+            <a:endParaRPr lang="en-US" sz="5328" b="0" strike="noStrike" spc="-1">
               <a:latin typeface="Arial"/>
             </a:endParaRPr>
           </a:p>
@@ -933,8 +933,8 @@
         </p:nvSpPr>
         <p:spPr>
           <a:xfrm>
-            <a:off x="170973" y="758068"/>
-            <a:ext cx="990840" cy="896169"/>
+            <a:off x="180022" y="710156"/>
+            <a:ext cx="1043280" cy="839527"/>
           </a:xfrm>
           <a:prstGeom prst="rect">
             <a:avLst/>
@@ -946,7 +946,7 @@
           </a:bodyPr>
           <a:lstStyle/>
           <a:p>
-            <a:endParaRPr lang="en-US" sz="3680" b="0" strike="noStrike" spc="-1">
+            <a:endParaRPr lang="en-US" sz="3875" b="0" strike="noStrike" spc="-1">
               <a:latin typeface="Arial"/>
             </a:endParaRPr>
           </a:p>
@@ -964,8 +964,8 @@
         </p:nvSpPr>
         <p:spPr>
           <a:xfrm>
-            <a:off x="1211490" y="758068"/>
-            <a:ext cx="990840" cy="896169"/>
+            <a:off x="1275608" y="710156"/>
+            <a:ext cx="1043280" cy="839527"/>
           </a:xfrm>
           <a:prstGeom prst="rect">
             <a:avLst/>
@@ -977,7 +977,7 @@
           </a:bodyPr>
           <a:lstStyle/>
           <a:p>
-            <a:endParaRPr lang="en-US" sz="3680" b="0" strike="noStrike" spc="-1">
+            <a:endParaRPr lang="en-US" sz="3875" b="0" strike="noStrike" spc="-1">
               <a:latin typeface="Arial"/>
             </a:endParaRPr>
           </a:p>
@@ -995,8 +995,8 @@
         </p:nvSpPr>
         <p:spPr>
           <a:xfrm>
-            <a:off x="2252007" y="758068"/>
-            <a:ext cx="990840" cy="896169"/>
+            <a:off x="2371194" y="710156"/>
+            <a:ext cx="1043280" cy="839527"/>
           </a:xfrm>
           <a:prstGeom prst="rect">
             <a:avLst/>
@@ -1008,7 +1008,7 @@
           </a:bodyPr>
           <a:lstStyle/>
           <a:p>
-            <a:endParaRPr lang="en-US" sz="3680" b="0" strike="noStrike" spc="-1">
+            <a:endParaRPr lang="en-US" sz="3875" b="0" strike="noStrike" spc="-1">
               <a:latin typeface="Arial"/>
             </a:endParaRPr>
           </a:p>
@@ -1026,8 +1026,8 @@
         </p:nvSpPr>
         <p:spPr>
           <a:xfrm>
-            <a:off x="170973" y="1739618"/>
-            <a:ext cx="990840" cy="896169"/>
+            <a:off x="180022" y="1629667"/>
+            <a:ext cx="1043280" cy="839527"/>
           </a:xfrm>
           <a:prstGeom prst="rect">
             <a:avLst/>
@@ -1039,7 +1039,7 @@
           </a:bodyPr>
           <a:lstStyle/>
           <a:p>
-            <a:endParaRPr lang="en-US" sz="3680" b="0" strike="noStrike" spc="-1">
+            <a:endParaRPr lang="en-US" sz="3875" b="0" strike="noStrike" spc="-1">
               <a:latin typeface="Arial"/>
             </a:endParaRPr>
           </a:p>
@@ -1057,8 +1057,8 @@
         </p:nvSpPr>
         <p:spPr>
           <a:xfrm>
-            <a:off x="1211490" y="1739618"/>
-            <a:ext cx="990840" cy="896169"/>
+            <a:off x="1275608" y="1629667"/>
+            <a:ext cx="1043280" cy="839527"/>
           </a:xfrm>
           <a:prstGeom prst="rect">
             <a:avLst/>
@@ -1070,7 +1070,7 @@
           </a:bodyPr>
           <a:lstStyle/>
           <a:p>
-            <a:endParaRPr lang="en-US" sz="3680" b="0" strike="noStrike" spc="-1">
+            <a:endParaRPr lang="en-US" sz="3875" b="0" strike="noStrike" spc="-1">
               <a:latin typeface="Arial"/>
             </a:endParaRPr>
           </a:p>
@@ -1088,8 +1088,8 @@
         </p:nvSpPr>
         <p:spPr>
           <a:xfrm>
-            <a:off x="2252007" y="1739618"/>
-            <a:ext cx="990840" cy="896169"/>
+            <a:off x="2371194" y="1629667"/>
+            <a:ext cx="1043280" cy="839527"/>
           </a:xfrm>
           <a:prstGeom prst="rect">
             <a:avLst/>
@@ -1101,7 +1101,7 @@
           </a:bodyPr>
           <a:lstStyle/>
           <a:p>
-            <a:endParaRPr lang="en-US" sz="3680" b="0" strike="noStrike" spc="-1">
+            <a:endParaRPr lang="en-US" sz="3875" b="0" strike="noStrike" spc="-1">
               <a:latin typeface="Arial"/>
             </a:endParaRPr>
           </a:p>
@@ -1144,8 +1144,8 @@
         </p:nvSpPr>
         <p:spPr>
           <a:xfrm>
-            <a:off x="170980" y="129264"/>
-            <a:ext cx="3077393" cy="540865"/>
+            <a:off x="180031" y="121094"/>
+            <a:ext cx="3240263" cy="506680"/>
           </a:xfrm>
           <a:prstGeom prst="rect">
             <a:avLst/>
@@ -1156,7 +1156,7 @@
           <a:lstStyle/>
           <a:p>
             <a:pPr algn="ctr"/>
-            <a:endParaRPr lang="en-US" sz="5060" b="0" strike="noStrike" spc="-1">
+            <a:endParaRPr lang="en-US" sz="5328" b="0" strike="noStrike" spc="-1">
               <a:latin typeface="Arial"/>
             </a:endParaRPr>
           </a:p>
@@ -1174,8 +1174,8 @@
         </p:nvSpPr>
         <p:spPr>
           <a:xfrm>
-            <a:off x="170980" y="758068"/>
-            <a:ext cx="3077393" cy="1879081"/>
+            <a:off x="180031" y="710155"/>
+            <a:ext cx="3240263" cy="1760315"/>
           </a:xfrm>
           <a:prstGeom prst="rect">
             <a:avLst/>
@@ -1186,7 +1186,7 @@
           <a:lstStyle/>
           <a:p>
             <a:pPr algn="ctr"/>
-            <a:endParaRPr lang="en-US" sz="3680" b="0" strike="noStrike" spc="-1">
+            <a:endParaRPr lang="en-US" sz="3875" b="0" strike="noStrike" spc="-1">
               <a:latin typeface="Arial"/>
             </a:endParaRPr>
           </a:p>
@@ -1229,8 +1229,8 @@
         </p:nvSpPr>
         <p:spPr>
           <a:xfrm>
-            <a:off x="170980" y="129264"/>
-            <a:ext cx="3077393" cy="540865"/>
+            <a:off x="180031" y="121094"/>
+            <a:ext cx="3240263" cy="506680"/>
           </a:xfrm>
           <a:prstGeom prst="rect">
             <a:avLst/>
@@ -1241,7 +1241,7 @@
           <a:lstStyle/>
           <a:p>
             <a:pPr algn="ctr"/>
-            <a:endParaRPr lang="en-US" sz="5060" b="0" strike="noStrike" spc="-1">
+            <a:endParaRPr lang="en-US" sz="5328" b="0" strike="noStrike" spc="-1">
               <a:latin typeface="Arial"/>
             </a:endParaRPr>
           </a:p>
@@ -1259,8 +1259,8 @@
         </p:nvSpPr>
         <p:spPr>
           <a:xfrm>
-            <a:off x="170980" y="758068"/>
-            <a:ext cx="3077393" cy="1879081"/>
+            <a:off x="180031" y="710155"/>
+            <a:ext cx="3240263" cy="1760315"/>
           </a:xfrm>
           <a:prstGeom prst="rect">
             <a:avLst/>
@@ -1272,7 +1272,7 @@
           </a:bodyPr>
           <a:lstStyle/>
           <a:p>
-            <a:endParaRPr lang="en-US" sz="3680" b="0" strike="noStrike" spc="-1">
+            <a:endParaRPr lang="en-US" sz="3875" b="0" strike="noStrike" spc="-1">
               <a:latin typeface="Arial"/>
             </a:endParaRPr>
           </a:p>
@@ -1315,8 +1315,8 @@
         </p:nvSpPr>
         <p:spPr>
           <a:xfrm>
-            <a:off x="170980" y="129264"/>
-            <a:ext cx="3077393" cy="540865"/>
+            <a:off x="180031" y="121094"/>
+            <a:ext cx="3240263" cy="506680"/>
           </a:xfrm>
           <a:prstGeom prst="rect">
             <a:avLst/>
@@ -1327,7 +1327,7 @@
           <a:lstStyle/>
           <a:p>
             <a:pPr algn="ctr"/>
-            <a:endParaRPr lang="en-US" sz="5060" b="0" strike="noStrike" spc="-1">
+            <a:endParaRPr lang="en-US" sz="5328" b="0" strike="noStrike" spc="-1">
               <a:latin typeface="Arial"/>
             </a:endParaRPr>
           </a:p>
@@ -1345,8 +1345,8 @@
         </p:nvSpPr>
         <p:spPr>
           <a:xfrm>
-            <a:off x="170975" y="758068"/>
-            <a:ext cx="1501742" cy="1879081"/>
+            <a:off x="180024" y="710155"/>
+            <a:ext cx="1581221" cy="1760315"/>
           </a:xfrm>
           <a:prstGeom prst="rect">
             <a:avLst/>
@@ -1358,7 +1358,7 @@
           </a:bodyPr>
           <a:lstStyle/>
           <a:p>
-            <a:endParaRPr lang="en-US" sz="3680" b="0" strike="noStrike" spc="-1">
+            <a:endParaRPr lang="en-US" sz="3875" b="0" strike="noStrike" spc="-1">
               <a:latin typeface="Arial"/>
             </a:endParaRPr>
           </a:p>
@@ -1376,8 +1376,8 @@
         </p:nvSpPr>
         <p:spPr>
           <a:xfrm>
-            <a:off x="1747975" y="758068"/>
-            <a:ext cx="1501742" cy="1879081"/>
+            <a:off x="1840487" y="710155"/>
+            <a:ext cx="1581221" cy="1760315"/>
           </a:xfrm>
           <a:prstGeom prst="rect">
             <a:avLst/>
@@ -1389,7 +1389,7 @@
           </a:bodyPr>
           <a:lstStyle/>
           <a:p>
-            <a:endParaRPr lang="en-US" sz="3680" b="0" strike="noStrike" spc="-1">
+            <a:endParaRPr lang="en-US" sz="3875" b="0" strike="noStrike" spc="-1">
               <a:latin typeface="Arial"/>
             </a:endParaRPr>
           </a:p>
@@ -1432,8 +1432,8 @@
         </p:nvSpPr>
         <p:spPr>
           <a:xfrm>
-            <a:off x="170980" y="129264"/>
-            <a:ext cx="3077393" cy="540865"/>
+            <a:off x="180031" y="121094"/>
+            <a:ext cx="3240263" cy="506680"/>
           </a:xfrm>
           <a:prstGeom prst="rect">
             <a:avLst/>
@@ -1444,7 +1444,7 @@
           <a:lstStyle/>
           <a:p>
             <a:pPr algn="ctr"/>
-            <a:endParaRPr lang="en-US" sz="5060" b="0" strike="noStrike" spc="-1">
+            <a:endParaRPr lang="en-US" sz="5328" b="0" strike="noStrike" spc="-1">
               <a:latin typeface="Arial"/>
             </a:endParaRPr>
           </a:p>
@@ -1487,8 +1487,8 @@
         </p:nvSpPr>
         <p:spPr>
           <a:xfrm>
-            <a:off x="170980" y="129271"/>
-            <a:ext cx="3077393" cy="2507709"/>
+            <a:off x="180031" y="121101"/>
+            <a:ext cx="3240263" cy="2349211"/>
           </a:xfrm>
           <a:prstGeom prst="rect">
             <a:avLst/>
@@ -1499,7 +1499,7 @@
           <a:lstStyle/>
           <a:p>
             <a:pPr algn="ctr"/>
-            <a:endParaRPr lang="en-US" sz="3680" b="0" strike="noStrike" spc="-1">
+            <a:endParaRPr lang="en-US" sz="3875" b="0" strike="noStrike" spc="-1">
               <a:latin typeface="Arial"/>
             </a:endParaRPr>
           </a:p>
@@ -1542,8 +1542,8 @@
         </p:nvSpPr>
         <p:spPr>
           <a:xfrm>
-            <a:off x="170980" y="129264"/>
-            <a:ext cx="3077393" cy="540865"/>
+            <a:off x="180031" y="121094"/>
+            <a:ext cx="3240263" cy="506680"/>
           </a:xfrm>
           <a:prstGeom prst="rect">
             <a:avLst/>
@@ -1554,7 +1554,7 @@
           <a:lstStyle/>
           <a:p>
             <a:pPr algn="ctr"/>
-            <a:endParaRPr lang="en-US" sz="5060" b="0" strike="noStrike" spc="-1">
+            <a:endParaRPr lang="en-US" sz="5328" b="0" strike="noStrike" spc="-1">
               <a:latin typeface="Arial"/>
             </a:endParaRPr>
           </a:p>
@@ -1572,8 +1572,8 @@
         </p:nvSpPr>
         <p:spPr>
           <a:xfrm>
-            <a:off x="170975" y="758068"/>
-            <a:ext cx="1501742" cy="896169"/>
+            <a:off x="180024" y="710156"/>
+            <a:ext cx="1581221" cy="839527"/>
           </a:xfrm>
           <a:prstGeom prst="rect">
             <a:avLst/>
@@ -1585,7 +1585,7 @@
           </a:bodyPr>
           <a:lstStyle/>
           <a:p>
-            <a:endParaRPr lang="en-US" sz="3680" b="0" strike="noStrike" spc="-1">
+            <a:endParaRPr lang="en-US" sz="3875" b="0" strike="noStrike" spc="-1">
               <a:latin typeface="Arial"/>
             </a:endParaRPr>
           </a:p>
@@ -1603,8 +1603,8 @@
         </p:nvSpPr>
         <p:spPr>
           <a:xfrm>
-            <a:off x="1747975" y="758068"/>
-            <a:ext cx="1501742" cy="1879081"/>
+            <a:off x="1840487" y="710155"/>
+            <a:ext cx="1581221" cy="1760315"/>
           </a:xfrm>
           <a:prstGeom prst="rect">
             <a:avLst/>
@@ -1616,7 +1616,7 @@
           </a:bodyPr>
           <a:lstStyle/>
           <a:p>
-            <a:endParaRPr lang="en-US" sz="3680" b="0" strike="noStrike" spc="-1">
+            <a:endParaRPr lang="en-US" sz="3875" b="0" strike="noStrike" spc="-1">
               <a:latin typeface="Arial"/>
             </a:endParaRPr>
           </a:p>
@@ -1634,8 +1634,8 @@
         </p:nvSpPr>
         <p:spPr>
           <a:xfrm>
-            <a:off x="170975" y="1739618"/>
-            <a:ext cx="1501742" cy="896169"/>
+            <a:off x="180024" y="1629667"/>
+            <a:ext cx="1581221" cy="839527"/>
           </a:xfrm>
           <a:prstGeom prst="rect">
             <a:avLst/>
@@ -1647,7 +1647,7 @@
           </a:bodyPr>
           <a:lstStyle/>
           <a:p>
-            <a:endParaRPr lang="en-US" sz="3680" b="0" strike="noStrike" spc="-1">
+            <a:endParaRPr lang="en-US" sz="3875" b="0" strike="noStrike" spc="-1">
               <a:latin typeface="Arial"/>
             </a:endParaRPr>
           </a:p>
@@ -1690,8 +1690,8 @@
         </p:nvSpPr>
         <p:spPr>
           <a:xfrm>
-            <a:off x="170980" y="129264"/>
-            <a:ext cx="3077393" cy="540865"/>
+            <a:off x="180031" y="121094"/>
+            <a:ext cx="3240263" cy="506680"/>
           </a:xfrm>
           <a:prstGeom prst="rect">
             <a:avLst/>
@@ -1702,7 +1702,7 @@
           <a:lstStyle/>
           <a:p>
             <a:pPr algn="ctr"/>
-            <a:endParaRPr lang="en-US" sz="5060" b="0" strike="noStrike" spc="-1">
+            <a:endParaRPr lang="en-US" sz="5328" b="0" strike="noStrike" spc="-1">
               <a:latin typeface="Arial"/>
             </a:endParaRPr>
           </a:p>
@@ -1720,8 +1720,8 @@
         </p:nvSpPr>
         <p:spPr>
           <a:xfrm>
-            <a:off x="170975" y="758068"/>
-            <a:ext cx="1501742" cy="1879081"/>
+            <a:off x="180024" y="710155"/>
+            <a:ext cx="1581221" cy="1760315"/>
           </a:xfrm>
           <a:prstGeom prst="rect">
             <a:avLst/>
@@ -1733,7 +1733,7 @@
           </a:bodyPr>
           <a:lstStyle/>
           <a:p>
-            <a:endParaRPr lang="en-US" sz="3680" b="0" strike="noStrike" spc="-1">
+            <a:endParaRPr lang="en-US" sz="3875" b="0" strike="noStrike" spc="-1">
               <a:latin typeface="Arial"/>
             </a:endParaRPr>
           </a:p>
@@ -1751,8 +1751,8 @@
         </p:nvSpPr>
         <p:spPr>
           <a:xfrm>
-            <a:off x="1747975" y="758068"/>
-            <a:ext cx="1501742" cy="896169"/>
+            <a:off x="1840487" y="710156"/>
+            <a:ext cx="1581221" cy="839527"/>
           </a:xfrm>
           <a:prstGeom prst="rect">
             <a:avLst/>
@@ -1764,7 +1764,7 @@
           </a:bodyPr>
           <a:lstStyle/>
           <a:p>
-            <a:endParaRPr lang="en-US" sz="3680" b="0" strike="noStrike" spc="-1">
+            <a:endParaRPr lang="en-US" sz="3875" b="0" strike="noStrike" spc="-1">
               <a:latin typeface="Arial"/>
             </a:endParaRPr>
           </a:p>
@@ -1782,8 +1782,8 @@
         </p:nvSpPr>
         <p:spPr>
           <a:xfrm>
-            <a:off x="1747975" y="1739618"/>
-            <a:ext cx="1501742" cy="896169"/>
+            <a:off x="1840487" y="1629667"/>
+            <a:ext cx="1581221" cy="839527"/>
           </a:xfrm>
           <a:prstGeom prst="rect">
             <a:avLst/>
@@ -1795,7 +1795,7 @@
           </a:bodyPr>
           <a:lstStyle/>
           <a:p>
-            <a:endParaRPr lang="en-US" sz="3680" b="0" strike="noStrike" spc="-1">
+            <a:endParaRPr lang="en-US" sz="3875" b="0" strike="noStrike" spc="-1">
               <a:latin typeface="Arial"/>
             </a:endParaRPr>
           </a:p>
@@ -1838,8 +1838,8 @@
         </p:nvSpPr>
         <p:spPr>
           <a:xfrm>
-            <a:off x="170980" y="129264"/>
-            <a:ext cx="3077393" cy="540865"/>
+            <a:off x="180031" y="121094"/>
+            <a:ext cx="3240263" cy="506680"/>
           </a:xfrm>
           <a:prstGeom prst="rect">
             <a:avLst/>
@@ -1850,7 +1850,7 @@
           <a:lstStyle/>
           <a:p>
             <a:pPr algn="ctr"/>
-            <a:endParaRPr lang="en-US" sz="5060" b="0" strike="noStrike" spc="-1">
+            <a:endParaRPr lang="en-US" sz="5328" b="0" strike="noStrike" spc="-1">
               <a:latin typeface="Arial"/>
             </a:endParaRPr>
           </a:p>
@@ -1868,8 +1868,8 @@
         </p:nvSpPr>
         <p:spPr>
           <a:xfrm>
-            <a:off x="170975" y="758068"/>
-            <a:ext cx="1501742" cy="896169"/>
+            <a:off x="180024" y="710156"/>
+            <a:ext cx="1581221" cy="839527"/>
           </a:xfrm>
           <a:prstGeom prst="rect">
             <a:avLst/>
@@ -1881,7 +1881,7 @@
           </a:bodyPr>
           <a:lstStyle/>
           <a:p>
-            <a:endParaRPr lang="en-US" sz="3680" b="0" strike="noStrike" spc="-1">
+            <a:endParaRPr lang="en-US" sz="3875" b="0" strike="noStrike" spc="-1">
               <a:latin typeface="Arial"/>
             </a:endParaRPr>
           </a:p>
@@ -1899,8 +1899,8 @@
         </p:nvSpPr>
         <p:spPr>
           <a:xfrm>
-            <a:off x="1747975" y="758068"/>
-            <a:ext cx="1501742" cy="896169"/>
+            <a:off x="1840487" y="710156"/>
+            <a:ext cx="1581221" cy="839527"/>
           </a:xfrm>
           <a:prstGeom prst="rect">
             <a:avLst/>
@@ -1912,7 +1912,7 @@
           </a:bodyPr>
           <a:lstStyle/>
           <a:p>
-            <a:endParaRPr lang="en-US" sz="3680" b="0" strike="noStrike" spc="-1">
+            <a:endParaRPr lang="en-US" sz="3875" b="0" strike="noStrike" spc="-1">
               <a:latin typeface="Arial"/>
             </a:endParaRPr>
           </a:p>
@@ -1930,8 +1930,8 @@
         </p:nvSpPr>
         <p:spPr>
           <a:xfrm>
-            <a:off x="170980" y="1739618"/>
-            <a:ext cx="3077393" cy="896169"/>
+            <a:off x="180031" y="1629667"/>
+            <a:ext cx="3240263" cy="839527"/>
           </a:xfrm>
           <a:prstGeom prst="rect">
             <a:avLst/>
@@ -1943,7 +1943,7 @@
           </a:bodyPr>
           <a:lstStyle/>
           <a:p>
-            <a:endParaRPr lang="en-US" sz="3680" b="0" strike="noStrike" spc="-1">
+            <a:endParaRPr lang="en-US" sz="3875" b="0" strike="noStrike" spc="-1">
               <a:latin typeface="Arial"/>
             </a:endParaRPr>
           </a:p>
@@ -1990,8 +1990,8 @@
         </p:nvSpPr>
         <p:spPr>
           <a:xfrm>
-            <a:off x="0" y="4"/>
-            <a:ext cx="53850" cy="3240088"/>
+            <a:off x="0" y="3"/>
+            <a:ext cx="56700" cy="3035300"/>
           </a:xfrm>
           <a:prstGeom prst="rect">
             <a:avLst/>
@@ -2024,8 +2024,8 @@
         </p:nvSpPr>
         <p:spPr>
           <a:xfrm>
-            <a:off x="0" y="8"/>
-            <a:ext cx="53850" cy="566208"/>
+            <a:off x="0" y="7"/>
+            <a:ext cx="56700" cy="530422"/>
           </a:xfrm>
           <a:prstGeom prst="rect">
             <a:avLst/>
@@ -2069,7 +2069,7 @@
   </p:sldLayoutIdLst>
   <p:txStyles>
     <p:titleStyle>
-      <a:lvl1pPr algn="l" defTabSz="1051438" rtl="0" eaLnBrk="1" latinLnBrk="1" hangingPunct="1">
+      <a:lvl1pPr algn="l" defTabSz="1107059" rtl="0" eaLnBrk="1" latinLnBrk="1" hangingPunct="1">
         <a:lnSpc>
           <a:spcPct val="90000"/>
         </a:lnSpc>
@@ -2077,7 +2077,7 @@
           <a:spcPct val="0"/>
         </a:spcBef>
         <a:buNone/>
-        <a:defRPr sz="5060" kern="1200">
+        <a:defRPr sz="5328" kern="1200">
           <a:solidFill>
             <a:schemeClr val="tx1"/>
           </a:solidFill>
@@ -2088,16 +2088,16 @@
       </a:lvl1pPr>
     </p:titleStyle>
     <p:bodyStyle>
-      <a:lvl1pPr marL="262859" indent="-262859" algn="l" defTabSz="1051438" rtl="0" eaLnBrk="1" latinLnBrk="1" hangingPunct="1">
+      <a:lvl1pPr marL="276764" indent="-276764" algn="l" defTabSz="1107059" rtl="0" eaLnBrk="1" latinLnBrk="1" hangingPunct="1">
         <a:lnSpc>
           <a:spcPct val="90000"/>
         </a:lnSpc>
         <a:spcBef>
-          <a:spcPts val="1150"/>
+          <a:spcPts val="1211"/>
         </a:spcBef>
         <a:buFont typeface="Arial" panose="020B0604020202020204" pitchFamily="34" charset="0"/>
         <a:buChar char="•"/>
-        <a:defRPr sz="3219" kern="1200">
+        <a:defRPr sz="3389" kern="1200">
           <a:solidFill>
             <a:schemeClr val="tx1"/>
           </a:solidFill>
@@ -2106,16 +2106,16 @@
           <a:cs typeface="+mn-cs"/>
         </a:defRPr>
       </a:lvl1pPr>
-      <a:lvl2pPr marL="788576" indent="-262859" algn="l" defTabSz="1051438" rtl="0" eaLnBrk="1" latinLnBrk="1" hangingPunct="1">
+      <a:lvl2pPr marL="830292" indent="-276764" algn="l" defTabSz="1107059" rtl="0" eaLnBrk="1" latinLnBrk="1" hangingPunct="1">
         <a:lnSpc>
           <a:spcPct val="90000"/>
         </a:lnSpc>
         <a:spcBef>
-          <a:spcPts val="575"/>
+          <a:spcPts val="605"/>
         </a:spcBef>
         <a:buFont typeface="Arial" panose="020B0604020202020204" pitchFamily="34" charset="0"/>
         <a:buChar char="•"/>
-        <a:defRPr sz="2759" kern="1200">
+        <a:defRPr sz="2905" kern="1200">
           <a:solidFill>
             <a:schemeClr val="tx1"/>
           </a:solidFill>
@@ -2124,16 +2124,16 @@
           <a:cs typeface="+mn-cs"/>
         </a:defRPr>
       </a:lvl2pPr>
-      <a:lvl3pPr marL="1314297" indent="-262859" algn="l" defTabSz="1051438" rtl="0" eaLnBrk="1" latinLnBrk="1" hangingPunct="1">
+      <a:lvl3pPr marL="1383823" indent="-276764" algn="l" defTabSz="1107059" rtl="0" eaLnBrk="1" latinLnBrk="1" hangingPunct="1">
         <a:lnSpc>
           <a:spcPct val="90000"/>
         </a:lnSpc>
         <a:spcBef>
-          <a:spcPts val="575"/>
+          <a:spcPts val="605"/>
         </a:spcBef>
         <a:buFont typeface="Arial" panose="020B0604020202020204" pitchFamily="34" charset="0"/>
         <a:buChar char="•"/>
-        <a:defRPr sz="2301" kern="1200">
+        <a:defRPr sz="2423" kern="1200">
           <a:solidFill>
             <a:schemeClr val="tx1"/>
           </a:solidFill>
@@ -2142,16 +2142,16 @@
           <a:cs typeface="+mn-cs"/>
         </a:defRPr>
       </a:lvl3pPr>
-      <a:lvl4pPr marL="1840014" indent="-262859" algn="l" defTabSz="1051438" rtl="0" eaLnBrk="1" latinLnBrk="1" hangingPunct="1">
+      <a:lvl4pPr marL="1937351" indent="-276764" algn="l" defTabSz="1107059" rtl="0" eaLnBrk="1" latinLnBrk="1" hangingPunct="1">
         <a:lnSpc>
           <a:spcPct val="90000"/>
         </a:lnSpc>
         <a:spcBef>
-          <a:spcPts val="575"/>
+          <a:spcPts val="605"/>
         </a:spcBef>
         <a:buFont typeface="Arial" panose="020B0604020202020204" pitchFamily="34" charset="0"/>
         <a:buChar char="•"/>
-        <a:defRPr sz="2070" kern="1200">
+        <a:defRPr sz="2180" kern="1200">
           <a:solidFill>
             <a:schemeClr val="tx1"/>
           </a:solidFill>
@@ -2160,16 +2160,16 @@
           <a:cs typeface="+mn-cs"/>
         </a:defRPr>
       </a:lvl4pPr>
-      <a:lvl5pPr marL="2365732" indent="-262859" algn="l" defTabSz="1051438" rtl="0" eaLnBrk="1" latinLnBrk="1" hangingPunct="1">
+      <a:lvl5pPr marL="2490879" indent="-276764" algn="l" defTabSz="1107059" rtl="0" eaLnBrk="1" latinLnBrk="1" hangingPunct="1">
         <a:lnSpc>
           <a:spcPct val="90000"/>
         </a:lnSpc>
         <a:spcBef>
-          <a:spcPts val="575"/>
+          <a:spcPts val="605"/>
         </a:spcBef>
         <a:buFont typeface="Arial" panose="020B0604020202020204" pitchFamily="34" charset="0"/>
         <a:buChar char="•"/>
-        <a:defRPr sz="2070" kern="1200">
+        <a:defRPr sz="2180" kern="1200">
           <a:solidFill>
             <a:schemeClr val="tx1"/>
           </a:solidFill>
@@ -2178,16 +2178,16 @@
           <a:cs typeface="+mn-cs"/>
         </a:defRPr>
       </a:lvl5pPr>
-      <a:lvl6pPr marL="2891451" indent="-262859" algn="l" defTabSz="1051438" rtl="0" eaLnBrk="1" latinLnBrk="1" hangingPunct="1">
+      <a:lvl6pPr marL="3044409" indent="-276764" algn="l" defTabSz="1107059" rtl="0" eaLnBrk="1" latinLnBrk="1" hangingPunct="1">
         <a:lnSpc>
           <a:spcPct val="90000"/>
         </a:lnSpc>
         <a:spcBef>
-          <a:spcPts val="575"/>
+          <a:spcPts val="605"/>
         </a:spcBef>
         <a:buFont typeface="Arial" panose="020B0604020202020204" pitchFamily="34" charset="0"/>
         <a:buChar char="•"/>
-        <a:defRPr sz="2070" kern="1200">
+        <a:defRPr sz="2180" kern="1200">
           <a:solidFill>
             <a:schemeClr val="tx1"/>
           </a:solidFill>
@@ -2196,16 +2196,16 @@
           <a:cs typeface="+mn-cs"/>
         </a:defRPr>
       </a:lvl6pPr>
-      <a:lvl7pPr marL="3417170" indent="-262859" algn="l" defTabSz="1051438" rtl="0" eaLnBrk="1" latinLnBrk="1" hangingPunct="1">
+      <a:lvl7pPr marL="3597938" indent="-276764" algn="l" defTabSz="1107059" rtl="0" eaLnBrk="1" latinLnBrk="1" hangingPunct="1">
         <a:lnSpc>
           <a:spcPct val="90000"/>
         </a:lnSpc>
         <a:spcBef>
-          <a:spcPts val="575"/>
+          <a:spcPts val="605"/>
         </a:spcBef>
         <a:buFont typeface="Arial" panose="020B0604020202020204" pitchFamily="34" charset="0"/>
         <a:buChar char="•"/>
-        <a:defRPr sz="2070" kern="1200">
+        <a:defRPr sz="2180" kern="1200">
           <a:solidFill>
             <a:schemeClr val="tx1"/>
           </a:solidFill>
@@ -2214,16 +2214,16 @@
           <a:cs typeface="+mn-cs"/>
         </a:defRPr>
       </a:lvl7pPr>
-      <a:lvl8pPr marL="3942888" indent="-262859" algn="l" defTabSz="1051438" rtl="0" eaLnBrk="1" latinLnBrk="1" hangingPunct="1">
+      <a:lvl8pPr marL="4151467" indent="-276764" algn="l" defTabSz="1107059" rtl="0" eaLnBrk="1" latinLnBrk="1" hangingPunct="1">
         <a:lnSpc>
           <a:spcPct val="90000"/>
         </a:lnSpc>
         <a:spcBef>
-          <a:spcPts val="575"/>
+          <a:spcPts val="605"/>
         </a:spcBef>
         <a:buFont typeface="Arial" panose="020B0604020202020204" pitchFamily="34" charset="0"/>
         <a:buChar char="•"/>
-        <a:defRPr sz="2070" kern="1200">
+        <a:defRPr sz="2180" kern="1200">
           <a:solidFill>
             <a:schemeClr val="tx1"/>
           </a:solidFill>
@@ -2232,16 +2232,16 @@
           <a:cs typeface="+mn-cs"/>
         </a:defRPr>
       </a:lvl8pPr>
-      <a:lvl9pPr marL="4468605" indent="-262859" algn="l" defTabSz="1051438" rtl="0" eaLnBrk="1" latinLnBrk="1" hangingPunct="1">
+      <a:lvl9pPr marL="4704994" indent="-276764" algn="l" defTabSz="1107059" rtl="0" eaLnBrk="1" latinLnBrk="1" hangingPunct="1">
         <a:lnSpc>
           <a:spcPct val="90000"/>
         </a:lnSpc>
         <a:spcBef>
-          <a:spcPts val="575"/>
+          <a:spcPts val="605"/>
         </a:spcBef>
         <a:buFont typeface="Arial" panose="020B0604020202020204" pitchFamily="34" charset="0"/>
         <a:buChar char="•"/>
-        <a:defRPr sz="2070" kern="1200">
+        <a:defRPr sz="2180" kern="1200">
           <a:solidFill>
             <a:schemeClr val="tx1"/>
           </a:solidFill>
@@ -2255,8 +2255,8 @@
       <a:defPPr>
         <a:defRPr lang="ko-KR"/>
       </a:defPPr>
-      <a:lvl1pPr marL="0" algn="l" defTabSz="1051438" rtl="0" eaLnBrk="1" latinLnBrk="1" hangingPunct="1">
-        <a:defRPr sz="2070" kern="1200">
+      <a:lvl1pPr marL="0" algn="l" defTabSz="1107059" rtl="0" eaLnBrk="1" latinLnBrk="1" hangingPunct="1">
+        <a:defRPr sz="2180" kern="1200">
           <a:solidFill>
             <a:schemeClr val="tx1"/>
           </a:solidFill>
@@ -2265,8 +2265,8 @@
           <a:cs typeface="+mn-cs"/>
         </a:defRPr>
       </a:lvl1pPr>
-      <a:lvl2pPr marL="525718" algn="l" defTabSz="1051438" rtl="0" eaLnBrk="1" latinLnBrk="1" hangingPunct="1">
-        <a:defRPr sz="2070" kern="1200">
+      <a:lvl2pPr marL="553528" algn="l" defTabSz="1107059" rtl="0" eaLnBrk="1" latinLnBrk="1" hangingPunct="1">
+        <a:defRPr sz="2180" kern="1200">
           <a:solidFill>
             <a:schemeClr val="tx1"/>
           </a:solidFill>
@@ -2275,8 +2275,8 @@
           <a:cs typeface="+mn-cs"/>
         </a:defRPr>
       </a:lvl2pPr>
-      <a:lvl3pPr marL="1051438" algn="l" defTabSz="1051438" rtl="0" eaLnBrk="1" latinLnBrk="1" hangingPunct="1">
-        <a:defRPr sz="2070" kern="1200">
+      <a:lvl3pPr marL="1107059" algn="l" defTabSz="1107059" rtl="0" eaLnBrk="1" latinLnBrk="1" hangingPunct="1">
+        <a:defRPr sz="2180" kern="1200">
           <a:solidFill>
             <a:schemeClr val="tx1"/>
           </a:solidFill>
@@ -2285,8 +2285,8 @@
           <a:cs typeface="+mn-cs"/>
         </a:defRPr>
       </a:lvl3pPr>
-      <a:lvl4pPr marL="1577156" algn="l" defTabSz="1051438" rtl="0" eaLnBrk="1" latinLnBrk="1" hangingPunct="1">
-        <a:defRPr sz="2070" kern="1200">
+      <a:lvl4pPr marL="1660588" algn="l" defTabSz="1107059" rtl="0" eaLnBrk="1" latinLnBrk="1" hangingPunct="1">
+        <a:defRPr sz="2180" kern="1200">
           <a:solidFill>
             <a:schemeClr val="tx1"/>
           </a:solidFill>
@@ -2295,8 +2295,8 @@
           <a:cs typeface="+mn-cs"/>
         </a:defRPr>
       </a:lvl4pPr>
-      <a:lvl5pPr marL="2102873" algn="l" defTabSz="1051438" rtl="0" eaLnBrk="1" latinLnBrk="1" hangingPunct="1">
-        <a:defRPr sz="2070" kern="1200">
+      <a:lvl5pPr marL="2214115" algn="l" defTabSz="1107059" rtl="0" eaLnBrk="1" latinLnBrk="1" hangingPunct="1">
+        <a:defRPr sz="2180" kern="1200">
           <a:solidFill>
             <a:schemeClr val="tx1"/>
           </a:solidFill>
@@ -2305,8 +2305,8 @@
           <a:cs typeface="+mn-cs"/>
         </a:defRPr>
       </a:lvl5pPr>
-      <a:lvl6pPr marL="2628591" algn="l" defTabSz="1051438" rtl="0" eaLnBrk="1" latinLnBrk="1" hangingPunct="1">
-        <a:defRPr sz="2070" kern="1200">
+      <a:lvl6pPr marL="2767643" algn="l" defTabSz="1107059" rtl="0" eaLnBrk="1" latinLnBrk="1" hangingPunct="1">
+        <a:defRPr sz="2180" kern="1200">
           <a:solidFill>
             <a:schemeClr val="tx1"/>
           </a:solidFill>
@@ -2315,8 +2315,8 @@
           <a:cs typeface="+mn-cs"/>
         </a:defRPr>
       </a:lvl6pPr>
-      <a:lvl7pPr marL="3154310" algn="l" defTabSz="1051438" rtl="0" eaLnBrk="1" latinLnBrk="1" hangingPunct="1">
-        <a:defRPr sz="2070" kern="1200">
+      <a:lvl7pPr marL="3321173" algn="l" defTabSz="1107059" rtl="0" eaLnBrk="1" latinLnBrk="1" hangingPunct="1">
+        <a:defRPr sz="2180" kern="1200">
           <a:solidFill>
             <a:schemeClr val="tx1"/>
           </a:solidFill>
@@ -2325,8 +2325,8 @@
           <a:cs typeface="+mn-cs"/>
         </a:defRPr>
       </a:lvl7pPr>
-      <a:lvl8pPr marL="3680029" algn="l" defTabSz="1051438" rtl="0" eaLnBrk="1" latinLnBrk="1" hangingPunct="1">
-        <a:defRPr sz="2070" kern="1200">
+      <a:lvl8pPr marL="3874703" algn="l" defTabSz="1107059" rtl="0" eaLnBrk="1" latinLnBrk="1" hangingPunct="1">
+        <a:defRPr sz="2180" kern="1200">
           <a:solidFill>
             <a:schemeClr val="tx1"/>
           </a:solidFill>
@@ -2335,8 +2335,8 @@
           <a:cs typeface="+mn-cs"/>
         </a:defRPr>
       </a:lvl8pPr>
-      <a:lvl9pPr marL="4205747" algn="l" defTabSz="1051438" rtl="0" eaLnBrk="1" latinLnBrk="1" hangingPunct="1">
-        <a:defRPr sz="2070" kern="1200">
+      <a:lvl9pPr marL="4428231" algn="l" defTabSz="1107059" rtl="0" eaLnBrk="1" latinLnBrk="1" hangingPunct="1">
+        <a:defRPr sz="2180" kern="1200">
           <a:solidFill>
             <a:schemeClr val="tx1"/>
           </a:solidFill>
@@ -2369,10 +2369,10 @@
       </p:grpSpPr>
       <p:grpSp>
         <p:nvGrpSpPr>
-          <p:cNvPr id="13" name="그룹 12">
+          <p:cNvPr id="2" name="그룹 1">
             <a:extLst>
               <a:ext uri="{FF2B5EF4-FFF2-40B4-BE49-F238E27FC236}">
-                <a16:creationId xmlns:a16="http://schemas.microsoft.com/office/drawing/2014/main" id="{5C361566-B6CB-47C4-89B9-38F6F2D8A3DF}"/>
+                <a16:creationId xmlns:a16="http://schemas.microsoft.com/office/drawing/2014/main" id="{6BF60647-D2CF-4A25-BB31-7EB4E8D32FF0}"/>
               </a:ext>
             </a:extLst>
           </p:cNvPr>
@@ -2381,18 +2381,382 @@
         </p:nvGrpSpPr>
         <p:grpSpPr>
           <a:xfrm>
-            <a:off x="-58568" y="-43075"/>
-            <a:ext cx="3478043" cy="3283163"/>
-            <a:chOff x="122407" y="-43075"/>
-            <a:chExt cx="3478043" cy="3283163"/>
+            <a:off x="0" y="7187"/>
+            <a:ext cx="3600450" cy="3020927"/>
+            <a:chOff x="0" y="0"/>
+            <a:chExt cx="3600450" cy="3020927"/>
           </a:xfrm>
         </p:grpSpPr>
+        <p:grpSp>
+          <p:nvGrpSpPr>
+            <p:cNvPr id="13" name="그룹 12">
+              <a:extLst>
+                <a:ext uri="{FF2B5EF4-FFF2-40B4-BE49-F238E27FC236}">
+                  <a16:creationId xmlns:a16="http://schemas.microsoft.com/office/drawing/2014/main" id="{5C361566-B6CB-47C4-89B9-38F6F2D8A3DF}"/>
+                </a:ext>
+              </a:extLst>
+            </p:cNvPr>
+            <p:cNvGrpSpPr>
+              <a:grpSpLocks noChangeAspect="1"/>
+            </p:cNvGrpSpPr>
+            <p:nvPr/>
+          </p:nvGrpSpPr>
+          <p:grpSpPr>
+            <a:xfrm>
+              <a:off x="225" y="1189206"/>
+              <a:ext cx="3600000" cy="1831721"/>
+              <a:chOff x="359545" y="1609187"/>
+              <a:chExt cx="3240905" cy="1649009"/>
+            </a:xfrm>
+          </p:grpSpPr>
+          <p:pic>
+            <p:nvPicPr>
+              <p:cNvPr id="8" name="그림 7">
+                <a:extLst>
+                  <a:ext uri="{FF2B5EF4-FFF2-40B4-BE49-F238E27FC236}">
+                    <a16:creationId xmlns:a16="http://schemas.microsoft.com/office/drawing/2014/main" id="{72DE56F5-5193-4D83-94C4-8837A2B8F5D6}"/>
+                  </a:ext>
+                </a:extLst>
+              </p:cNvPr>
+              <p:cNvPicPr>
+                <a:picLocks/>
+              </p:cNvPicPr>
+              <p:nvPr/>
+            </p:nvPicPr>
+            <p:blipFill>
+              <a:blip r:embed="rId3">
+                <a:extLst>
+                  <a:ext uri="{28A0092B-C50C-407E-A947-70E740481C1C}">
+                    <a14:useLocalDpi xmlns:a14="http://schemas.microsoft.com/office/drawing/2010/main" val="0"/>
+                  </a:ext>
+                </a:extLst>
+              </a:blip>
+              <a:stretch>
+                <a:fillRect/>
+              </a:stretch>
+            </p:blipFill>
+            <p:spPr>
+              <a:xfrm>
+                <a:off x="1980450" y="1620088"/>
+                <a:ext cx="1620000" cy="1620000"/>
+              </a:xfrm>
+              <a:prstGeom prst="rect">
+                <a:avLst/>
+              </a:prstGeom>
+              <a:ln>
+                <a:solidFill>
+                  <a:schemeClr val="tx1"/>
+                </a:solidFill>
+              </a:ln>
+            </p:spPr>
+          </p:pic>
+          <p:pic>
+            <p:nvPicPr>
+              <p:cNvPr id="10" name="그림 9">
+                <a:extLst>
+                  <a:ext uri="{FF2B5EF4-FFF2-40B4-BE49-F238E27FC236}">
+                    <a16:creationId xmlns:a16="http://schemas.microsoft.com/office/drawing/2014/main" id="{E06D5577-C201-490E-BFB7-89F6B4C571B7}"/>
+                  </a:ext>
+                </a:extLst>
+              </p:cNvPr>
+              <p:cNvPicPr>
+                <a:picLocks/>
+              </p:cNvPicPr>
+              <p:nvPr/>
+            </p:nvPicPr>
+            <p:blipFill>
+              <a:blip r:embed="rId4">
+                <a:extLst>
+                  <a:ext uri="{28A0092B-C50C-407E-A947-70E740481C1C}">
+                    <a14:useLocalDpi xmlns:a14="http://schemas.microsoft.com/office/drawing/2010/main" val="0"/>
+                  </a:ext>
+                </a:extLst>
+              </a:blip>
+              <a:stretch>
+                <a:fillRect/>
+              </a:stretch>
+            </p:blipFill>
+            <p:spPr>
+              <a:xfrm>
+                <a:off x="359545" y="1620088"/>
+                <a:ext cx="1620000" cy="1620000"/>
+              </a:xfrm>
+              <a:prstGeom prst="rect">
+                <a:avLst/>
+              </a:prstGeom>
+              <a:ln>
+                <a:solidFill>
+                  <a:schemeClr val="tx1"/>
+                </a:solidFill>
+              </a:ln>
+            </p:spPr>
+          </p:pic>
+          <p:cxnSp>
+            <p:nvCxnSpPr>
+              <p:cNvPr id="32" name="직선 화살표 연결선 31">
+                <a:extLst>
+                  <a:ext uri="{FF2B5EF4-FFF2-40B4-BE49-F238E27FC236}">
+                    <a16:creationId xmlns:a16="http://schemas.microsoft.com/office/drawing/2014/main" id="{6AA4DDAD-7718-4CD2-89BE-070969DE556F}"/>
+                  </a:ext>
+                </a:extLst>
+              </p:cNvPr>
+              <p:cNvCxnSpPr>
+                <a:cxnSpLocks/>
+              </p:cNvCxnSpPr>
+              <p:nvPr/>
+            </p:nvCxnSpPr>
+            <p:spPr>
+              <a:xfrm flipV="1">
+                <a:off x="366587" y="1626441"/>
+                <a:ext cx="1608757" cy="1613647"/>
+              </a:xfrm>
+              <a:prstGeom prst="straightConnector1">
+                <a:avLst/>
+              </a:prstGeom>
+              <a:ln>
+                <a:solidFill>
+                  <a:schemeClr val="bg1"/>
+                </a:solidFill>
+                <a:headEnd type="stealth"/>
+                <a:tailEnd type="stealth"/>
+              </a:ln>
+            </p:spPr>
+            <p:style>
+              <a:lnRef idx="1">
+                <a:schemeClr val="accent1"/>
+              </a:lnRef>
+              <a:fillRef idx="0">
+                <a:schemeClr val="accent1"/>
+              </a:fillRef>
+              <a:effectRef idx="0">
+                <a:schemeClr val="accent1"/>
+              </a:effectRef>
+              <a:fontRef idx="minor">
+                <a:schemeClr val="tx1"/>
+              </a:fontRef>
+            </p:style>
+          </p:cxnSp>
+          <mc:AlternateContent xmlns:mc="http://schemas.openxmlformats.org/markup-compatibility/2006">
+            <mc:Choice xmlns:a14="http://schemas.microsoft.com/office/drawing/2010/main" Requires="a14">
+              <p:sp>
+                <p:nvSpPr>
+                  <p:cNvPr id="33" name="TextBox 32">
+                    <a:extLst>
+                      <a:ext uri="{FF2B5EF4-FFF2-40B4-BE49-F238E27FC236}">
+                        <a16:creationId xmlns:a16="http://schemas.microsoft.com/office/drawing/2014/main" id="{1DB29360-B2CF-46A4-890C-6DC282C6AC36}"/>
+                      </a:ext>
+                    </a:extLst>
+                  </p:cNvPr>
+                  <p:cNvSpPr txBox="1"/>
+                  <p:nvPr/>
+                </p:nvSpPr>
+                <p:spPr>
+                  <a:xfrm>
+                    <a:off x="559121" y="3029204"/>
+                    <a:ext cx="246465" cy="228992"/>
+                  </a:xfrm>
+                  <a:prstGeom prst="rect">
+                    <a:avLst/>
+                  </a:prstGeom>
+                  <a:noFill/>
+                </p:spPr>
+                <p:txBody>
+                  <a:bodyPr wrap="square" rtlCol="0">
+                    <a:spAutoFit/>
+                  </a:bodyPr>
+                  <a:lstStyle/>
+                  <a:p>
+                    <a:pPr algn="ctr"/>
+                    <a14:m>
+                      <m:oMathPara xmlns:m="http://schemas.openxmlformats.org/officeDocument/2006/math">
+                        <m:oMathParaPr>
+                          <m:jc m:val="centerGroup"/>
+                        </m:oMathParaPr>
+                        <m:oMath xmlns:m="http://schemas.openxmlformats.org/officeDocument/2006/math">
+                          <m:r>
+                            <a:rPr lang="en-US" altLang="ko-KR" sz="1053" b="1" i="1" dirty="0">
+                              <a:solidFill>
+                                <a:schemeClr val="bg1"/>
+                              </a:solidFill>
+                              <a:latin typeface="Cambria Math" panose="02040503050406030204" pitchFamily="18" charset="0"/>
+                              <a:cs typeface="helvetica" panose="020B0604020202020204" pitchFamily="34" charset="0"/>
+                            </a:rPr>
+                            <m:t>𝟏𝟎𝟎</m:t>
+                          </m:r>
+                          <m:r>
+                            <a:rPr lang="en-US" altLang="ko-KR" sz="1053" b="1" i="1" dirty="0">
+                              <a:solidFill>
+                                <a:schemeClr val="bg1"/>
+                              </a:solidFill>
+                              <a:latin typeface="Cambria Math" panose="02040503050406030204" pitchFamily="18" charset="0"/>
+                              <a:cs typeface="helvetica" panose="020B0604020202020204" pitchFamily="34" charset="0"/>
+                            </a:rPr>
+                            <m:t>°</m:t>
+                          </m:r>
+                        </m:oMath>
+                      </m:oMathPara>
+                    </a14:m>
+                    <a:endParaRPr lang="ko-KR" altLang="en-US" sz="1053" b="1" dirty="0">
+                      <a:solidFill>
+                        <a:schemeClr val="bg1"/>
+                      </a:solidFill>
+                      <a:latin typeface="helvetica" panose="020B0604020202020204" pitchFamily="34" charset="0"/>
+                      <a:cs typeface="helvetica" panose="020B0604020202020204" pitchFamily="34" charset="0"/>
+                    </a:endParaRPr>
+                  </a:p>
+                </p:txBody>
+              </p:sp>
+            </mc:Choice>
+            <mc:Fallback>
+              <p:sp>
+                <p:nvSpPr>
+                  <p:cNvPr id="33" name="TextBox 32">
+                    <a:extLst>
+                      <a:ext uri="{FF2B5EF4-FFF2-40B4-BE49-F238E27FC236}">
+                        <a16:creationId xmlns:a16="http://schemas.microsoft.com/office/drawing/2014/main" id="{1DB29360-B2CF-46A4-890C-6DC282C6AC36}"/>
+                      </a:ext>
+                    </a:extLst>
+                  </p:cNvPr>
+                  <p:cNvSpPr txBox="1">
+                    <a:spLocks noRot="1" noChangeAspect="1" noMove="1" noResize="1" noEditPoints="1" noAdjustHandles="1" noChangeArrowheads="1" noChangeShapeType="1" noTextEdit="1"/>
+                  </p:cNvSpPr>
+                  <p:nvPr/>
+                </p:nvSpPr>
+                <p:spPr>
+                  <a:xfrm>
+                    <a:off x="559121" y="3029204"/>
+                    <a:ext cx="246465" cy="228992"/>
+                  </a:xfrm>
+                  <a:prstGeom prst="rect">
+                    <a:avLst/>
+                  </a:prstGeom>
+                  <a:blipFill>
+                    <a:blip r:embed="rId5"/>
+                    <a:stretch>
+                      <a:fillRect l="-26667" r="-13333"/>
+                    </a:stretch>
+                  </a:blipFill>
+                </p:spPr>
+                <p:txBody>
+                  <a:bodyPr/>
+                  <a:lstStyle/>
+                  <a:p>
+                    <a:r>
+                      <a:rPr lang="ko-KR" altLang="en-US">
+                        <a:noFill/>
+                      </a:rPr>
+                      <a:t> </a:t>
+                    </a:r>
+                  </a:p>
+                </p:txBody>
+              </p:sp>
+            </mc:Fallback>
+          </mc:AlternateContent>
+          <p:sp>
+            <p:nvSpPr>
+              <p:cNvPr id="7" name="TextBox 6">
+                <a:extLst>
+                  <a:ext uri="{FF2B5EF4-FFF2-40B4-BE49-F238E27FC236}">
+                    <a16:creationId xmlns:a16="http://schemas.microsoft.com/office/drawing/2014/main" id="{0FF46201-A366-4A3C-BE03-4A96D4A4D989}"/>
+                  </a:ext>
+                </a:extLst>
+              </p:cNvPr>
+              <p:cNvSpPr txBox="1"/>
+              <p:nvPr/>
+            </p:nvSpPr>
+            <p:spPr>
+              <a:xfrm>
+                <a:off x="521269" y="1609187"/>
+                <a:ext cx="1296552" cy="243539"/>
+              </a:xfrm>
+              <a:prstGeom prst="rect">
+                <a:avLst/>
+              </a:prstGeom>
+              <a:noFill/>
+            </p:spPr>
+            <p:txBody>
+              <a:bodyPr wrap="square" rtlCol="0">
+                <a:spAutoFit/>
+              </a:bodyPr>
+              <a:lstStyle/>
+              <a:p>
+                <a:pPr algn="ctr"/>
+                <a:r>
+                  <a:rPr lang="en-US" altLang="ko-KR" sz="1158" b="1" dirty="0">
+                    <a:solidFill>
+                      <a:schemeClr val="bg1"/>
+                    </a:solidFill>
+                    <a:latin typeface="helvetica" panose="020B0604020202020204" pitchFamily="34" charset="0"/>
+                    <a:cs typeface="helvetica" panose="020B0604020202020204" pitchFamily="34" charset="0"/>
+                  </a:rPr>
+                  <a:t>Raw</a:t>
+                </a:r>
+                <a:endParaRPr lang="ko-KR" altLang="en-US" sz="1158" b="1" dirty="0">
+                  <a:solidFill>
+                    <a:schemeClr val="bg1"/>
+                  </a:solidFill>
+                  <a:latin typeface="helvetica" panose="020B0604020202020204" pitchFamily="34" charset="0"/>
+                  <a:cs typeface="helvetica" panose="020B0604020202020204" pitchFamily="34" charset="0"/>
+                </a:endParaRPr>
+              </a:p>
+            </p:txBody>
+          </p:sp>
+          <p:sp>
+            <p:nvSpPr>
+              <p:cNvPr id="16" name="TextBox 15">
+                <a:extLst>
+                  <a:ext uri="{FF2B5EF4-FFF2-40B4-BE49-F238E27FC236}">
+                    <a16:creationId xmlns:a16="http://schemas.microsoft.com/office/drawing/2014/main" id="{9AA0DBBC-4329-4CE0-A8F0-F306B3001743}"/>
+                  </a:ext>
+                </a:extLst>
+              </p:cNvPr>
+              <p:cNvSpPr txBox="1"/>
+              <p:nvPr/>
+            </p:nvSpPr>
+            <p:spPr>
+              <a:xfrm>
+                <a:off x="2142174" y="1609187"/>
+                <a:ext cx="1296552" cy="243539"/>
+              </a:xfrm>
+              <a:prstGeom prst="rect">
+                <a:avLst/>
+              </a:prstGeom>
+              <a:noFill/>
+            </p:spPr>
+            <p:txBody>
+              <a:bodyPr wrap="square" rtlCol="0">
+                <a:spAutoFit/>
+              </a:bodyPr>
+              <a:lstStyle/>
+              <a:p>
+                <a:pPr algn="ctr"/>
+                <a:r>
+                  <a:rPr lang="en-US" altLang="ko-KR" sz="1158" b="1" dirty="0">
+                    <a:solidFill>
+                      <a:schemeClr val="bg1"/>
+                    </a:solidFill>
+                    <a:latin typeface="helvetica" panose="020B0604020202020204" pitchFamily="34" charset="0"/>
+                    <a:cs typeface="helvetica" panose="020B0604020202020204" pitchFamily="34" charset="0"/>
+                  </a:rPr>
+                  <a:t>Reconstruction</a:t>
+                </a:r>
+                <a:endParaRPr lang="ko-KR" altLang="en-US" sz="1158" b="1" dirty="0">
+                  <a:solidFill>
+                    <a:schemeClr val="bg1"/>
+                  </a:solidFill>
+                  <a:latin typeface="helvetica" panose="020B0604020202020204" pitchFamily="34" charset="0"/>
+                  <a:cs typeface="helvetica" panose="020B0604020202020204" pitchFamily="34" charset="0"/>
+                </a:endParaRPr>
+              </a:p>
+            </p:txBody>
+          </p:sp>
+        </p:grpSp>
         <p:pic>
           <p:nvPicPr>
-            <p:cNvPr id="8" name="그림 7">
+            <p:cNvPr id="17" name="Main graphic">
               <a:extLst>
                 <a:ext uri="{FF2B5EF4-FFF2-40B4-BE49-F238E27FC236}">
-                  <a16:creationId xmlns:a16="http://schemas.microsoft.com/office/drawing/2014/main" id="{72DE56F5-5193-4D83-94C4-8837A2B8F5D6}"/>
+                  <a16:creationId xmlns:a16="http://schemas.microsoft.com/office/drawing/2014/main" id="{49DF1A5B-3C20-4EEA-BAF5-0963E5726799}"/>
                 </a:ext>
               </a:extLst>
             </p:cNvPr>
@@ -2401,22 +2765,15 @@
             </p:cNvPicPr>
             <p:nvPr/>
           </p:nvPicPr>
-          <p:blipFill>
-            <a:blip r:embed="rId3">
-              <a:extLst>
-                <a:ext uri="{28A0092B-C50C-407E-A947-70E740481C1C}">
-                  <a14:useLocalDpi xmlns:a14="http://schemas.microsoft.com/office/drawing/2010/main" val="0"/>
-                </a:ext>
-              </a:extLst>
-            </a:blip>
-            <a:stretch>
-              <a:fillRect/>
-            </a:stretch>
+          <p:blipFill rotWithShape="1">
+            <a:blip r:embed="rId6"/>
+            <a:srcRect l="4311" t="21552" r="72509" b="60106"/>
+            <a:stretch/>
           </p:blipFill>
           <p:spPr>
             <a:xfrm>
-              <a:off x="359545" y="1620088"/>
-              <a:ext cx="1620000" cy="1620000"/>
+              <a:off x="0" y="0"/>
+              <a:ext cx="1800000" cy="1187375"/>
             </a:xfrm>
             <a:prstGeom prst="rect">
               <a:avLst/>
@@ -2430,10 +2787,10 @@
         </p:pic>
         <p:pic>
           <p:nvPicPr>
-            <p:cNvPr id="10" name="그림 9">
+            <p:cNvPr id="18" name="Main graphic">
               <a:extLst>
                 <a:ext uri="{FF2B5EF4-FFF2-40B4-BE49-F238E27FC236}">
-                  <a16:creationId xmlns:a16="http://schemas.microsoft.com/office/drawing/2014/main" id="{E06D5577-C201-490E-BFB7-89F6B4C571B7}"/>
+                  <a16:creationId xmlns:a16="http://schemas.microsoft.com/office/drawing/2014/main" id="{D001AD94-155A-4CF5-B7C4-3BB677E5ED3D}"/>
                 </a:ext>
               </a:extLst>
             </p:cNvPr>
@@ -2442,22 +2799,15 @@
             </p:cNvPicPr>
             <p:nvPr/>
           </p:nvPicPr>
-          <p:blipFill>
-            <a:blip r:embed="rId4">
-              <a:extLst>
-                <a:ext uri="{28A0092B-C50C-407E-A947-70E740481C1C}">
-                  <a14:useLocalDpi xmlns:a14="http://schemas.microsoft.com/office/drawing/2010/main" val="0"/>
-                </a:ext>
-              </a:extLst>
-            </a:blip>
-            <a:stretch>
-              <a:fillRect/>
-            </a:stretch>
+          <p:blipFill rotWithShape="1">
+            <a:blip r:embed="rId6"/>
+            <a:srcRect l="28067" t="21552" r="48756" b="60106"/>
+            <a:stretch/>
           </p:blipFill>
           <p:spPr>
             <a:xfrm>
-              <a:off x="1980450" y="1620088"/>
-              <a:ext cx="1620000" cy="1620000"/>
+              <a:off x="1800450" y="0"/>
+              <a:ext cx="1800000" cy="1188984"/>
             </a:xfrm>
             <a:prstGeom prst="rect">
               <a:avLst/>
@@ -2469,433 +2819,6 @@
             </a:ln>
           </p:spPr>
         </p:pic>
-        <p:pic>
-          <p:nvPicPr>
-            <p:cNvPr id="12" name="그림 11">
-              <a:extLst>
-                <a:ext uri="{FF2B5EF4-FFF2-40B4-BE49-F238E27FC236}">
-                  <a16:creationId xmlns:a16="http://schemas.microsoft.com/office/drawing/2014/main" id="{5E7EDF87-0293-48F4-9ACB-81DD0B6B623C}"/>
-                </a:ext>
-              </a:extLst>
-            </p:cNvPr>
-            <p:cNvPicPr>
-              <a:picLocks/>
-            </p:cNvPicPr>
-            <p:nvPr/>
-          </p:nvPicPr>
-          <p:blipFill>
-            <a:blip r:embed="rId5">
-              <a:extLst>
-                <a:ext uri="{28A0092B-C50C-407E-A947-70E740481C1C}">
-                  <a14:useLocalDpi xmlns:a14="http://schemas.microsoft.com/office/drawing/2010/main" val="0"/>
-                </a:ext>
-              </a:extLst>
-            </a:blip>
-            <a:stretch>
-              <a:fillRect/>
-            </a:stretch>
-          </p:blipFill>
-          <p:spPr>
-            <a:xfrm>
-              <a:off x="1980450" y="0"/>
-              <a:ext cx="1620000" cy="1620000"/>
-            </a:xfrm>
-            <a:prstGeom prst="rect">
-              <a:avLst/>
-            </a:prstGeom>
-            <a:ln>
-              <a:solidFill>
-                <a:schemeClr val="tx1"/>
-              </a:solidFill>
-            </a:ln>
-          </p:spPr>
-        </p:pic>
-        <p:pic>
-          <p:nvPicPr>
-            <p:cNvPr id="14" name="그림 13">
-              <a:extLst>
-                <a:ext uri="{FF2B5EF4-FFF2-40B4-BE49-F238E27FC236}">
-                  <a16:creationId xmlns:a16="http://schemas.microsoft.com/office/drawing/2014/main" id="{3F49710F-A9F8-47EF-9C38-0307CE041284}"/>
-                </a:ext>
-              </a:extLst>
-            </p:cNvPr>
-            <p:cNvPicPr>
-              <a:picLocks/>
-            </p:cNvPicPr>
-            <p:nvPr/>
-          </p:nvPicPr>
-          <p:blipFill>
-            <a:blip r:embed="rId6">
-              <a:extLst>
-                <a:ext uri="{28A0092B-C50C-407E-A947-70E740481C1C}">
-                  <a14:useLocalDpi xmlns:a14="http://schemas.microsoft.com/office/drawing/2010/main" val="0"/>
-                </a:ext>
-              </a:extLst>
-            </a:blip>
-            <a:stretch>
-              <a:fillRect/>
-            </a:stretch>
-          </p:blipFill>
-          <p:spPr>
-            <a:xfrm>
-              <a:off x="359545" y="0"/>
-              <a:ext cx="1620000" cy="1620000"/>
-            </a:xfrm>
-            <a:prstGeom prst="rect">
-              <a:avLst/>
-            </a:prstGeom>
-            <a:ln>
-              <a:solidFill>
-                <a:schemeClr val="tx1"/>
-              </a:solidFill>
-            </a:ln>
-          </p:spPr>
-        </p:pic>
-        <p:cxnSp>
-          <p:nvCxnSpPr>
-            <p:cNvPr id="32" name="직선 화살표 연결선 31">
-              <a:extLst>
-                <a:ext uri="{FF2B5EF4-FFF2-40B4-BE49-F238E27FC236}">
-                  <a16:creationId xmlns:a16="http://schemas.microsoft.com/office/drawing/2014/main" id="{6AA4DDAD-7718-4CD2-89BE-070969DE556F}"/>
-                </a:ext>
-              </a:extLst>
-            </p:cNvPr>
-            <p:cNvCxnSpPr>
-              <a:cxnSpLocks/>
-            </p:cNvCxnSpPr>
-            <p:nvPr/>
-          </p:nvCxnSpPr>
-          <p:spPr>
-            <a:xfrm flipV="1">
-              <a:off x="366587" y="0"/>
-              <a:ext cx="1608757" cy="1613647"/>
-            </a:xfrm>
-            <a:prstGeom prst="straightConnector1">
-              <a:avLst/>
-            </a:prstGeom>
-            <a:ln>
-              <a:solidFill>
-                <a:schemeClr val="bg1"/>
-              </a:solidFill>
-              <a:headEnd type="stealth"/>
-              <a:tailEnd type="stealth"/>
-            </a:ln>
-          </p:spPr>
-          <p:style>
-            <a:lnRef idx="1">
-              <a:schemeClr val="accent1"/>
-            </a:lnRef>
-            <a:fillRef idx="0">
-              <a:schemeClr val="accent1"/>
-            </a:fillRef>
-            <a:effectRef idx="0">
-              <a:schemeClr val="accent1"/>
-            </a:effectRef>
-            <a:fontRef idx="minor">
-              <a:schemeClr val="tx1"/>
-            </a:fontRef>
-          </p:style>
-        </p:cxnSp>
-        <mc:AlternateContent xmlns:mc="http://schemas.openxmlformats.org/markup-compatibility/2006">
-          <mc:Choice xmlns:a14="http://schemas.microsoft.com/office/drawing/2010/main" Requires="a14">
-            <p:sp>
-              <p:nvSpPr>
-                <p:cNvPr id="33" name="TextBox 32">
-                  <a:extLst>
-                    <a:ext uri="{FF2B5EF4-FFF2-40B4-BE49-F238E27FC236}">
-                      <a16:creationId xmlns:a16="http://schemas.microsoft.com/office/drawing/2014/main" id="{1DB29360-B2CF-46A4-890C-6DC282C6AC36}"/>
-                    </a:ext>
-                  </a:extLst>
-                </p:cNvPr>
-                <p:cNvSpPr txBox="1"/>
-                <p:nvPr/>
-              </p:nvSpPr>
-              <p:spPr>
-                <a:xfrm>
-                  <a:off x="618886" y="1319092"/>
-                  <a:ext cx="246465" cy="253274"/>
-                </a:xfrm>
-                <a:prstGeom prst="rect">
-                  <a:avLst/>
-                </a:prstGeom>
-                <a:noFill/>
-              </p:spPr>
-              <p:txBody>
-                <a:bodyPr wrap="square" rtlCol="0">
-                  <a:spAutoFit/>
-                </a:bodyPr>
-                <a:lstStyle/>
-                <a:p>
-                  <a:pPr algn="ctr"/>
-                  <a14:m>
-                    <m:oMathPara xmlns:m="http://schemas.openxmlformats.org/officeDocument/2006/math">
-                      <m:oMathParaPr>
-                        <m:jc m:val="centerGroup"/>
-                      </m:oMathParaPr>
-                      <m:oMath xmlns:m="http://schemas.openxmlformats.org/officeDocument/2006/math">
-                        <m:r>
-                          <a:rPr lang="en-US" altLang="ko-KR" sz="1000" b="1" i="1" dirty="0">
-                            <a:solidFill>
-                              <a:schemeClr val="bg1"/>
-                            </a:solidFill>
-                            <a:latin typeface="Cambria Math" panose="02040503050406030204" pitchFamily="18" charset="0"/>
-                            <a:cs typeface="helvetica" panose="020B0604020202020204" pitchFamily="34" charset="0"/>
-                          </a:rPr>
-                          <m:t>𝟏𝟎𝟎</m:t>
-                        </m:r>
-                        <m:r>
-                          <a:rPr lang="en-US" altLang="ko-KR" sz="1000" b="1" i="1" dirty="0">
-                            <a:solidFill>
-                              <a:schemeClr val="bg1"/>
-                            </a:solidFill>
-                            <a:latin typeface="Cambria Math" panose="02040503050406030204" pitchFamily="18" charset="0"/>
-                            <a:cs typeface="helvetica" panose="020B0604020202020204" pitchFamily="34" charset="0"/>
-                          </a:rPr>
-                          <m:t>°</m:t>
-                        </m:r>
-                      </m:oMath>
-                    </m:oMathPara>
-                  </a14:m>
-                  <a:endParaRPr lang="ko-KR" altLang="en-US" sz="1000" b="1" dirty="0">
-                    <a:solidFill>
-                      <a:schemeClr val="bg1"/>
-                    </a:solidFill>
-                    <a:latin typeface="helvetica" panose="020B0604020202020204" pitchFamily="34" charset="0"/>
-                    <a:cs typeface="helvetica" panose="020B0604020202020204" pitchFamily="34" charset="0"/>
-                  </a:endParaRPr>
-                </a:p>
-              </p:txBody>
-            </p:sp>
-          </mc:Choice>
-          <mc:Fallback>
-            <p:sp>
-              <p:nvSpPr>
-                <p:cNvPr id="33" name="TextBox 32">
-                  <a:extLst>
-                    <a:ext uri="{FF2B5EF4-FFF2-40B4-BE49-F238E27FC236}">
-                      <a16:creationId xmlns:a16="http://schemas.microsoft.com/office/drawing/2014/main" id="{1DB29360-B2CF-46A4-890C-6DC282C6AC36}"/>
-                    </a:ext>
-                  </a:extLst>
-                </p:cNvPr>
-                <p:cNvSpPr txBox="1">
-                  <a:spLocks noRot="1" noChangeAspect="1" noMove="1" noResize="1" noEditPoints="1" noAdjustHandles="1" noChangeArrowheads="1" noChangeShapeType="1" noTextEdit="1"/>
-                </p:cNvSpPr>
-                <p:nvPr/>
-              </p:nvSpPr>
-              <p:spPr>
-                <a:xfrm>
-                  <a:off x="618886" y="1319092"/>
-                  <a:ext cx="246465" cy="253274"/>
-                </a:xfrm>
-                <a:prstGeom prst="rect">
-                  <a:avLst/>
-                </a:prstGeom>
-                <a:blipFill>
-                  <a:blip r:embed="rId7"/>
-                  <a:stretch>
-                    <a:fillRect l="-32500" r="-20000"/>
-                  </a:stretch>
-                </a:blipFill>
-              </p:spPr>
-              <p:txBody>
-                <a:bodyPr/>
-                <a:lstStyle/>
-                <a:p>
-                  <a:r>
-                    <a:rPr lang="ko-KR" altLang="en-US">
-                      <a:noFill/>
-                    </a:rPr>
-                    <a:t> </a:t>
-                  </a:r>
-                </a:p>
-              </p:txBody>
-            </p:sp>
-          </mc:Fallback>
-        </mc:AlternateContent>
-        <p:sp>
-          <p:nvSpPr>
-            <p:cNvPr id="4" name="TextBox 3">
-              <a:extLst>
-                <a:ext uri="{FF2B5EF4-FFF2-40B4-BE49-F238E27FC236}">
-                  <a16:creationId xmlns:a16="http://schemas.microsoft.com/office/drawing/2014/main" id="{9D20D69F-357C-4908-A803-397CD34418DA}"/>
-                </a:ext>
-              </a:extLst>
-            </p:cNvPr>
-            <p:cNvSpPr txBox="1"/>
-            <p:nvPr/>
-          </p:nvSpPr>
-          <p:spPr>
-            <a:xfrm>
-              <a:off x="598722" y="-43075"/>
-              <a:ext cx="1141647" cy="261610"/>
-            </a:xfrm>
-            <a:prstGeom prst="rect">
-              <a:avLst/>
-            </a:prstGeom>
-            <a:noFill/>
-          </p:spPr>
-          <p:txBody>
-            <a:bodyPr wrap="square" rtlCol="0">
-              <a:spAutoFit/>
-            </a:bodyPr>
-            <a:lstStyle/>
-            <a:p>
-              <a:pPr algn="ctr"/>
-              <a:r>
-                <a:rPr lang="en-US" altLang="ko-KR" sz="1100" b="1" dirty="0">
-                  <a:solidFill>
-                    <a:schemeClr val="bg1"/>
-                  </a:solidFill>
-                  <a:latin typeface="helvetica" panose="020B0604020202020204" pitchFamily="34" charset="0"/>
-                  <a:cs typeface="helvetica" panose="020B0604020202020204" pitchFamily="34" charset="0"/>
-                </a:rPr>
-                <a:t>Raw</a:t>
-              </a:r>
-              <a:endParaRPr lang="ko-KR" altLang="en-US" sz="1100" b="1" dirty="0">
-                <a:solidFill>
-                  <a:schemeClr val="bg1"/>
-                </a:solidFill>
-                <a:latin typeface="helvetica" panose="020B0604020202020204" pitchFamily="34" charset="0"/>
-                <a:cs typeface="helvetica" panose="020B0604020202020204" pitchFamily="34" charset="0"/>
-              </a:endParaRPr>
-            </a:p>
-          </p:txBody>
-        </p:sp>
-        <p:sp>
-          <p:nvSpPr>
-            <p:cNvPr id="5" name="TextBox 4">
-              <a:extLst>
-                <a:ext uri="{FF2B5EF4-FFF2-40B4-BE49-F238E27FC236}">
-                  <a16:creationId xmlns:a16="http://schemas.microsoft.com/office/drawing/2014/main" id="{C89DE598-7CAB-4474-AAE1-818256996A53}"/>
-                </a:ext>
-              </a:extLst>
-            </p:cNvPr>
-            <p:cNvSpPr txBox="1"/>
-            <p:nvPr/>
-          </p:nvSpPr>
-          <p:spPr>
-            <a:xfrm>
-              <a:off x="2170448" y="-43075"/>
-              <a:ext cx="1240004" cy="261610"/>
-            </a:xfrm>
-            <a:prstGeom prst="rect">
-              <a:avLst/>
-            </a:prstGeom>
-            <a:noFill/>
-          </p:spPr>
-          <p:txBody>
-            <a:bodyPr wrap="square" rtlCol="0">
-              <a:spAutoFit/>
-            </a:bodyPr>
-            <a:lstStyle/>
-            <a:p>
-              <a:pPr algn="ctr"/>
-              <a:r>
-                <a:rPr lang="en-US" altLang="ko-KR" sz="1100" b="1" dirty="0">
-                  <a:solidFill>
-                    <a:schemeClr val="bg1"/>
-                  </a:solidFill>
-                  <a:latin typeface="helvetica" panose="020B0604020202020204" pitchFamily="34" charset="0"/>
-                  <a:cs typeface="helvetica" panose="020B0604020202020204" pitchFamily="34" charset="0"/>
-                </a:rPr>
-                <a:t>Reconstructed</a:t>
-              </a:r>
-              <a:endParaRPr lang="ko-KR" altLang="en-US" sz="1100" b="1" dirty="0">
-                <a:solidFill>
-                  <a:schemeClr val="bg1"/>
-                </a:solidFill>
-                <a:latin typeface="helvetica" panose="020B0604020202020204" pitchFamily="34" charset="0"/>
-                <a:cs typeface="helvetica" panose="020B0604020202020204" pitchFamily="34" charset="0"/>
-              </a:endParaRPr>
-            </a:p>
-          </p:txBody>
-        </p:sp>
-        <p:sp>
-          <p:nvSpPr>
-            <p:cNvPr id="6" name="TextBox 5">
-              <a:extLst>
-                <a:ext uri="{FF2B5EF4-FFF2-40B4-BE49-F238E27FC236}">
-                  <a16:creationId xmlns:a16="http://schemas.microsoft.com/office/drawing/2014/main" id="{0E14188E-BA84-4CF2-A5C2-7BDE212F8ECD}"/>
-                </a:ext>
-              </a:extLst>
-            </p:cNvPr>
-            <p:cNvSpPr txBox="1"/>
-            <p:nvPr/>
-          </p:nvSpPr>
-          <p:spPr>
-            <a:xfrm rot="16200000">
-              <a:off x="-82280" y="679195"/>
-              <a:ext cx="670983" cy="261610"/>
-            </a:xfrm>
-            <a:prstGeom prst="rect">
-              <a:avLst/>
-            </a:prstGeom>
-            <a:noFill/>
-          </p:spPr>
-          <p:txBody>
-            <a:bodyPr wrap="square" rtlCol="0">
-              <a:spAutoFit/>
-            </a:bodyPr>
-            <a:lstStyle/>
-            <a:p>
-              <a:pPr algn="ctr"/>
-              <a:r>
-                <a:rPr lang="en-US" altLang="ko-KR" sz="1100" b="1" dirty="0">
-                  <a:latin typeface="helvetica" panose="020B0604020202020204" pitchFamily="34" charset="0"/>
-                  <a:cs typeface="helvetica" panose="020B0604020202020204" pitchFamily="34" charset="0"/>
-                </a:rPr>
-                <a:t>Singlet</a:t>
-              </a:r>
-              <a:endParaRPr lang="ko-KR" altLang="en-US" sz="1100" b="1" dirty="0">
-                <a:latin typeface="helvetica" panose="020B0604020202020204" pitchFamily="34" charset="0"/>
-                <a:cs typeface="helvetica" panose="020B0604020202020204" pitchFamily="34" charset="0"/>
-              </a:endParaRPr>
-            </a:p>
-          </p:txBody>
-        </p:sp>
-        <p:sp>
-          <p:nvSpPr>
-            <p:cNvPr id="7" name="TextBox 6">
-              <a:extLst>
-                <a:ext uri="{FF2B5EF4-FFF2-40B4-BE49-F238E27FC236}">
-                  <a16:creationId xmlns:a16="http://schemas.microsoft.com/office/drawing/2014/main" id="{0FF46201-A366-4A3C-BE03-4A96D4A4D989}"/>
-                </a:ext>
-              </a:extLst>
-            </p:cNvPr>
-            <p:cNvSpPr txBox="1"/>
-            <p:nvPr/>
-          </p:nvSpPr>
-          <p:spPr>
-            <a:xfrm rot="16200000">
-              <a:off x="-72501" y="2317283"/>
-              <a:ext cx="670983" cy="261610"/>
-            </a:xfrm>
-            <a:prstGeom prst="rect">
-              <a:avLst/>
-            </a:prstGeom>
-            <a:noFill/>
-          </p:spPr>
-          <p:txBody>
-            <a:bodyPr wrap="square" rtlCol="0">
-              <a:spAutoFit/>
-            </a:bodyPr>
-            <a:lstStyle/>
-            <a:p>
-              <a:pPr algn="ctr"/>
-              <a:r>
-                <a:rPr lang="en-US" altLang="ko-KR" sz="1100" b="1" dirty="0">
-                  <a:latin typeface="helvetica" panose="020B0604020202020204" pitchFamily="34" charset="0"/>
-                  <a:cs typeface="helvetica" panose="020B0604020202020204" pitchFamily="34" charset="0"/>
-                </a:rPr>
-                <a:t>Ours</a:t>
-              </a:r>
-              <a:endParaRPr lang="ko-KR" altLang="en-US" sz="1100" b="1" dirty="0">
-                <a:latin typeface="helvetica" panose="020B0604020202020204" pitchFamily="34" charset="0"/>
-                <a:cs typeface="helvetica" panose="020B0604020202020204" pitchFamily="34" charset="0"/>
-              </a:endParaRPr>
-            </a:p>
-          </p:txBody>
-        </p:sp>
       </p:grpSp>
     </p:spTree>
   </p:cSld>

</xml_diff>